<commit_message>
Added Ward's patented Q and A slide
</commit_message>
<xml_diff>
--- a/Presentation.pptx
+++ b/Presentation.pptx
@@ -4,8 +4,12 @@
   <p:sldMasterIdLst>
     <p:sldMasterId id="2147483648" r:id="rId1"/>
   </p:sldMasterIdLst>
+  <p:notesMasterIdLst>
+    <p:notesMasterId r:id="rId4"/>
+  </p:notesMasterIdLst>
   <p:sldIdLst>
     <p:sldId id="256" r:id="rId2"/>
+    <p:sldId id="258" r:id="rId3"/>
   </p:sldIdLst>
   <p:sldSz cx="12192000" cy="6858000"/>
   <p:notesSz cx="6858000" cy="9144000"/>
@@ -104,7 +108,454 @@
       </a:defRPr>
     </a:lvl9pPr>
   </p:defaultTextStyle>
+  <p:extLst>
+    <p:ext uri="{EFAFB233-063F-42B5-8137-9DF3F51BA10A}">
+      <p15:sldGuideLst xmlns:p15="http://schemas.microsoft.com/office/powerpoint/2012/main"/>
+    </p:ext>
+  </p:extLst>
 </p:presentation>
+</file>
+
+<file path=ppt/notesMasters/notesMaster1.xml><?xml version="1.0" encoding="utf-8"?>
+<p:notesMaster xmlns:a="http://schemas.openxmlformats.org/drawingml/2006/main" xmlns:r="http://schemas.openxmlformats.org/officeDocument/2006/relationships" xmlns:p="http://schemas.openxmlformats.org/presentationml/2006/main">
+  <p:cSld>
+    <p:bg>
+      <p:bgRef idx="1001">
+        <a:schemeClr val="bg1"/>
+      </p:bgRef>
+    </p:bg>
+    <p:spTree>
+      <p:nvGrpSpPr>
+        <p:cNvPr id="1" name=""/>
+        <p:cNvGrpSpPr/>
+        <p:nvPr/>
+      </p:nvGrpSpPr>
+      <p:grpSpPr>
+        <a:xfrm>
+          <a:off x="0" y="0"/>
+          <a:ext cx="0" cy="0"/>
+          <a:chOff x="0" y="0"/>
+          <a:chExt cx="0" cy="0"/>
+        </a:xfrm>
+      </p:grpSpPr>
+      <p:sp>
+        <p:nvSpPr>
+          <p:cNvPr id="2" name="Header Placeholder 1"/>
+          <p:cNvSpPr>
+            <a:spLocks noGrp="1"/>
+          </p:cNvSpPr>
+          <p:nvPr>
+            <p:ph type="hdr" sz="quarter"/>
+          </p:nvPr>
+        </p:nvSpPr>
+        <p:spPr>
+          <a:xfrm>
+            <a:off x="0" y="0"/>
+            <a:ext cx="2971800" cy="458788"/>
+          </a:xfrm>
+          <a:prstGeom prst="rect">
+            <a:avLst/>
+          </a:prstGeom>
+        </p:spPr>
+        <p:txBody>
+          <a:bodyPr vert="horz" lIns="91440" tIns="45720" rIns="91440" bIns="45720" rtlCol="0"/>
+          <a:lstStyle>
+            <a:lvl1pPr algn="l">
+              <a:defRPr sz="1200"/>
+            </a:lvl1pPr>
+          </a:lstStyle>
+          <a:p>
+            <a:endParaRPr lang="en-US"/>
+          </a:p>
+        </p:txBody>
+      </p:sp>
+      <p:sp>
+        <p:nvSpPr>
+          <p:cNvPr id="3" name="Date Placeholder 2"/>
+          <p:cNvSpPr>
+            <a:spLocks noGrp="1"/>
+          </p:cNvSpPr>
+          <p:nvPr>
+            <p:ph type="dt" idx="1"/>
+          </p:nvPr>
+        </p:nvSpPr>
+        <p:spPr>
+          <a:xfrm>
+            <a:off x="3884613" y="0"/>
+            <a:ext cx="2971800" cy="458788"/>
+          </a:xfrm>
+          <a:prstGeom prst="rect">
+            <a:avLst/>
+          </a:prstGeom>
+        </p:spPr>
+        <p:txBody>
+          <a:bodyPr vert="horz" lIns="91440" tIns="45720" rIns="91440" bIns="45720" rtlCol="0"/>
+          <a:lstStyle>
+            <a:lvl1pPr algn="r">
+              <a:defRPr sz="1200"/>
+            </a:lvl1pPr>
+          </a:lstStyle>
+          <a:p>
+            <a:fld id="{6DEA2D6B-2036-48C4-B6A3-B1726010EC68}" type="datetimeFigureOut">
+              <a:rPr lang="en-US" smtClean="0"/>
+              <a:t>4/24/2016</a:t>
+            </a:fld>
+            <a:endParaRPr lang="en-US"/>
+          </a:p>
+        </p:txBody>
+      </p:sp>
+      <p:sp>
+        <p:nvSpPr>
+          <p:cNvPr id="4" name="Slide Image Placeholder 3"/>
+          <p:cNvSpPr>
+            <a:spLocks noGrp="1" noRot="1" noChangeAspect="1"/>
+          </p:cNvSpPr>
+          <p:nvPr>
+            <p:ph type="sldImg" idx="2"/>
+          </p:nvPr>
+        </p:nvSpPr>
+        <p:spPr>
+          <a:xfrm>
+            <a:off x="685800" y="1143000"/>
+            <a:ext cx="5486400" cy="3086100"/>
+          </a:xfrm>
+          <a:prstGeom prst="rect">
+            <a:avLst/>
+          </a:prstGeom>
+          <a:noFill/>
+          <a:ln w="12700">
+            <a:solidFill>
+              <a:prstClr val="black"/>
+            </a:solidFill>
+          </a:ln>
+        </p:spPr>
+        <p:txBody>
+          <a:bodyPr vert="horz" lIns="91440" tIns="45720" rIns="91440" bIns="45720" rtlCol="0" anchor="ctr"/>
+          <a:lstStyle/>
+          <a:p>
+            <a:endParaRPr lang="en-US"/>
+          </a:p>
+        </p:txBody>
+      </p:sp>
+      <p:sp>
+        <p:nvSpPr>
+          <p:cNvPr id="5" name="Notes Placeholder 4"/>
+          <p:cNvSpPr>
+            <a:spLocks noGrp="1"/>
+          </p:cNvSpPr>
+          <p:nvPr>
+            <p:ph type="body" sz="quarter" idx="3"/>
+          </p:nvPr>
+        </p:nvSpPr>
+        <p:spPr>
+          <a:xfrm>
+            <a:off x="685800" y="4400550"/>
+            <a:ext cx="5486400" cy="3600450"/>
+          </a:xfrm>
+          <a:prstGeom prst="rect">
+            <a:avLst/>
+          </a:prstGeom>
+        </p:spPr>
+        <p:txBody>
+          <a:bodyPr vert="horz" lIns="91440" tIns="45720" rIns="91440" bIns="45720" rtlCol="0"/>
+          <a:lstStyle/>
+          <a:p>
+            <a:pPr lvl="0"/>
+            <a:r>
+              <a:rPr lang="en-US" smtClean="0"/>
+              <a:t>Click to edit Master text styles</a:t>
+            </a:r>
+          </a:p>
+          <a:p>
+            <a:pPr lvl="1"/>
+            <a:r>
+              <a:rPr lang="en-US" smtClean="0"/>
+              <a:t>Second level</a:t>
+            </a:r>
+          </a:p>
+          <a:p>
+            <a:pPr lvl="2"/>
+            <a:r>
+              <a:rPr lang="en-US" smtClean="0"/>
+              <a:t>Third level</a:t>
+            </a:r>
+          </a:p>
+          <a:p>
+            <a:pPr lvl="3"/>
+            <a:r>
+              <a:rPr lang="en-US" smtClean="0"/>
+              <a:t>Fourth level</a:t>
+            </a:r>
+          </a:p>
+          <a:p>
+            <a:pPr lvl="4"/>
+            <a:r>
+              <a:rPr lang="en-US" smtClean="0"/>
+              <a:t>Fifth level</a:t>
+            </a:r>
+            <a:endParaRPr lang="en-US"/>
+          </a:p>
+        </p:txBody>
+      </p:sp>
+      <p:sp>
+        <p:nvSpPr>
+          <p:cNvPr id="6" name="Footer Placeholder 5"/>
+          <p:cNvSpPr>
+            <a:spLocks noGrp="1"/>
+          </p:cNvSpPr>
+          <p:nvPr>
+            <p:ph type="ftr" sz="quarter" idx="4"/>
+          </p:nvPr>
+        </p:nvSpPr>
+        <p:spPr>
+          <a:xfrm>
+            <a:off x="0" y="8685213"/>
+            <a:ext cx="2971800" cy="458787"/>
+          </a:xfrm>
+          <a:prstGeom prst="rect">
+            <a:avLst/>
+          </a:prstGeom>
+        </p:spPr>
+        <p:txBody>
+          <a:bodyPr vert="horz" lIns="91440" tIns="45720" rIns="91440" bIns="45720" rtlCol="0" anchor="b"/>
+          <a:lstStyle>
+            <a:lvl1pPr algn="l">
+              <a:defRPr sz="1200"/>
+            </a:lvl1pPr>
+          </a:lstStyle>
+          <a:p>
+            <a:endParaRPr lang="en-US"/>
+          </a:p>
+        </p:txBody>
+      </p:sp>
+      <p:sp>
+        <p:nvSpPr>
+          <p:cNvPr id="7" name="Slide Number Placeholder 6"/>
+          <p:cNvSpPr>
+            <a:spLocks noGrp="1"/>
+          </p:cNvSpPr>
+          <p:nvPr>
+            <p:ph type="sldNum" sz="quarter" idx="5"/>
+          </p:nvPr>
+        </p:nvSpPr>
+        <p:spPr>
+          <a:xfrm>
+            <a:off x="3884613" y="8685213"/>
+            <a:ext cx="2971800" cy="458787"/>
+          </a:xfrm>
+          <a:prstGeom prst="rect">
+            <a:avLst/>
+          </a:prstGeom>
+        </p:spPr>
+        <p:txBody>
+          <a:bodyPr vert="horz" lIns="91440" tIns="45720" rIns="91440" bIns="45720" rtlCol="0" anchor="b"/>
+          <a:lstStyle>
+            <a:lvl1pPr algn="r">
+              <a:defRPr sz="1200"/>
+            </a:lvl1pPr>
+          </a:lstStyle>
+          <a:p>
+            <a:fld id="{D8D2C28D-C399-4E63-8D39-67E40D035F08}" type="slidenum">
+              <a:rPr lang="en-US" smtClean="0"/>
+              <a:t>‹#›</a:t>
+            </a:fld>
+            <a:endParaRPr lang="en-US"/>
+          </a:p>
+        </p:txBody>
+      </p:sp>
+    </p:spTree>
+    <p:extLst>
+      <p:ext uri="{BB962C8B-B14F-4D97-AF65-F5344CB8AC3E}">
+        <p14:creationId xmlns:p14="http://schemas.microsoft.com/office/powerpoint/2010/main" val="1485483418"/>
+      </p:ext>
+    </p:extLst>
+  </p:cSld>
+  <p:clrMap bg1="lt1" tx1="dk1" bg2="lt2" tx2="dk2" accent1="accent1" accent2="accent2" accent3="accent3" accent4="accent4" accent5="accent5" accent6="accent6" hlink="hlink" folHlink="folHlink"/>
+  <p:notesStyle>
+    <a:lvl1pPr marL="0" algn="l" defTabSz="914400" rtl="0" eaLnBrk="1" latinLnBrk="0" hangingPunct="1">
+      <a:defRPr sz="1200" kern="1200">
+        <a:solidFill>
+          <a:schemeClr val="tx1"/>
+        </a:solidFill>
+        <a:latin typeface="+mn-lt"/>
+        <a:ea typeface="+mn-ea"/>
+        <a:cs typeface="+mn-cs"/>
+      </a:defRPr>
+    </a:lvl1pPr>
+    <a:lvl2pPr marL="457200" algn="l" defTabSz="914400" rtl="0" eaLnBrk="1" latinLnBrk="0" hangingPunct="1">
+      <a:defRPr sz="1200" kern="1200">
+        <a:solidFill>
+          <a:schemeClr val="tx1"/>
+        </a:solidFill>
+        <a:latin typeface="+mn-lt"/>
+        <a:ea typeface="+mn-ea"/>
+        <a:cs typeface="+mn-cs"/>
+      </a:defRPr>
+    </a:lvl2pPr>
+    <a:lvl3pPr marL="914400" algn="l" defTabSz="914400" rtl="0" eaLnBrk="1" latinLnBrk="0" hangingPunct="1">
+      <a:defRPr sz="1200" kern="1200">
+        <a:solidFill>
+          <a:schemeClr val="tx1"/>
+        </a:solidFill>
+        <a:latin typeface="+mn-lt"/>
+        <a:ea typeface="+mn-ea"/>
+        <a:cs typeface="+mn-cs"/>
+      </a:defRPr>
+    </a:lvl3pPr>
+    <a:lvl4pPr marL="1371600" algn="l" defTabSz="914400" rtl="0" eaLnBrk="1" latinLnBrk="0" hangingPunct="1">
+      <a:defRPr sz="1200" kern="1200">
+        <a:solidFill>
+          <a:schemeClr val="tx1"/>
+        </a:solidFill>
+        <a:latin typeface="+mn-lt"/>
+        <a:ea typeface="+mn-ea"/>
+        <a:cs typeface="+mn-cs"/>
+      </a:defRPr>
+    </a:lvl4pPr>
+    <a:lvl5pPr marL="1828800" algn="l" defTabSz="914400" rtl="0" eaLnBrk="1" latinLnBrk="0" hangingPunct="1">
+      <a:defRPr sz="1200" kern="1200">
+        <a:solidFill>
+          <a:schemeClr val="tx1"/>
+        </a:solidFill>
+        <a:latin typeface="+mn-lt"/>
+        <a:ea typeface="+mn-ea"/>
+        <a:cs typeface="+mn-cs"/>
+      </a:defRPr>
+    </a:lvl5pPr>
+    <a:lvl6pPr marL="2286000" algn="l" defTabSz="914400" rtl="0" eaLnBrk="1" latinLnBrk="0" hangingPunct="1">
+      <a:defRPr sz="1200" kern="1200">
+        <a:solidFill>
+          <a:schemeClr val="tx1"/>
+        </a:solidFill>
+        <a:latin typeface="+mn-lt"/>
+        <a:ea typeface="+mn-ea"/>
+        <a:cs typeface="+mn-cs"/>
+      </a:defRPr>
+    </a:lvl6pPr>
+    <a:lvl7pPr marL="2743200" algn="l" defTabSz="914400" rtl="0" eaLnBrk="1" latinLnBrk="0" hangingPunct="1">
+      <a:defRPr sz="1200" kern="1200">
+        <a:solidFill>
+          <a:schemeClr val="tx1"/>
+        </a:solidFill>
+        <a:latin typeface="+mn-lt"/>
+        <a:ea typeface="+mn-ea"/>
+        <a:cs typeface="+mn-cs"/>
+      </a:defRPr>
+    </a:lvl7pPr>
+    <a:lvl8pPr marL="3200400" algn="l" defTabSz="914400" rtl="0" eaLnBrk="1" latinLnBrk="0" hangingPunct="1">
+      <a:defRPr sz="1200" kern="1200">
+        <a:solidFill>
+          <a:schemeClr val="tx1"/>
+        </a:solidFill>
+        <a:latin typeface="+mn-lt"/>
+        <a:ea typeface="+mn-ea"/>
+        <a:cs typeface="+mn-cs"/>
+      </a:defRPr>
+    </a:lvl8pPr>
+    <a:lvl9pPr marL="3657600" algn="l" defTabSz="914400" rtl="0" eaLnBrk="1" latinLnBrk="0" hangingPunct="1">
+      <a:defRPr sz="1200" kern="1200">
+        <a:solidFill>
+          <a:schemeClr val="tx1"/>
+        </a:solidFill>
+        <a:latin typeface="+mn-lt"/>
+        <a:ea typeface="+mn-ea"/>
+        <a:cs typeface="+mn-cs"/>
+      </a:defRPr>
+    </a:lvl9pPr>
+  </p:notesStyle>
+</p:notesMaster>
+</file>
+
+<file path=ppt/notesSlides/notesSlide1.xml><?xml version="1.0" encoding="utf-8"?>
+<p:notes xmlns:a="http://schemas.openxmlformats.org/drawingml/2006/main" xmlns:r="http://schemas.openxmlformats.org/officeDocument/2006/relationships" xmlns:p="http://schemas.openxmlformats.org/presentationml/2006/main">
+  <p:cSld>
+    <p:spTree>
+      <p:nvGrpSpPr>
+        <p:cNvPr id="1" name=""/>
+        <p:cNvGrpSpPr/>
+        <p:nvPr/>
+      </p:nvGrpSpPr>
+      <p:grpSpPr>
+        <a:xfrm>
+          <a:off x="0" y="0"/>
+          <a:ext cx="0" cy="0"/>
+          <a:chOff x="0" y="0"/>
+          <a:chExt cx="0" cy="0"/>
+        </a:xfrm>
+      </p:grpSpPr>
+      <p:sp>
+        <p:nvSpPr>
+          <p:cNvPr id="56322" name="Slide Image Placeholder 1"/>
+          <p:cNvSpPr>
+            <a:spLocks noGrp="1" noRot="1" noChangeAspect="1" noTextEdit="1"/>
+          </p:cNvSpPr>
+          <p:nvPr>
+            <p:ph type="sldImg"/>
+          </p:nvPr>
+        </p:nvSpPr>
+        <p:spPr>
+          <a:ln/>
+        </p:spPr>
+      </p:sp>
+      <p:sp>
+        <p:nvSpPr>
+          <p:cNvPr id="56323" name="Notes Placeholder 2"/>
+          <p:cNvSpPr>
+            <a:spLocks noGrp="1"/>
+          </p:cNvSpPr>
+          <p:nvPr>
+            <p:ph type="body" idx="1"/>
+          </p:nvPr>
+        </p:nvSpPr>
+        <p:spPr>
+          <a:noFill/>
+          <a:ln/>
+        </p:spPr>
+        <p:txBody>
+          <a:bodyPr/>
+          <a:lstStyle/>
+          <a:p>
+            <a:endParaRPr lang="en-US" smtClean="0"/>
+          </a:p>
+        </p:txBody>
+      </p:sp>
+      <p:sp>
+        <p:nvSpPr>
+          <p:cNvPr id="56324" name="Slide Number Placeholder 3"/>
+          <p:cNvSpPr>
+            <a:spLocks noGrp="1"/>
+          </p:cNvSpPr>
+          <p:nvPr>
+            <p:ph type="sldNum" sz="quarter" idx="5"/>
+          </p:nvPr>
+        </p:nvSpPr>
+        <p:spPr>
+          <a:noFill/>
+        </p:spPr>
+        <p:txBody>
+          <a:bodyPr/>
+          <a:lstStyle/>
+          <a:p>
+            <a:fld id="{2BAF69FA-8F2D-41D5-BC73-0469DBD37D74}" type="slidenum">
+              <a:rPr lang="en-US"/>
+              <a:pPr/>
+              <a:t>2</a:t>
+            </a:fld>
+            <a:endParaRPr lang="en-US"/>
+          </a:p>
+        </p:txBody>
+      </p:sp>
+    </p:spTree>
+    <p:extLst>
+      <p:ext uri="{BB962C8B-B14F-4D97-AF65-F5344CB8AC3E}">
+        <p14:creationId xmlns:p14="http://schemas.microsoft.com/office/powerpoint/2010/main" val="3998495796"/>
+      </p:ext>
+    </p:extLst>
+  </p:cSld>
+  <p:clrMapOvr>
+    <a:masterClrMapping/>
+  </p:clrMapOvr>
+</p:notes>
 </file>
 
 <file path=ppt/slideLayouts/slideLayout1.xml><?xml version="1.0" encoding="utf-8"?>
@@ -3041,6 +3492,464 @@
 </p:sld>
 </file>
 
+<file path=ppt/slides/slide2.xml><?xml version="1.0" encoding="utf-8"?>
+<p:sld xmlns:a="http://schemas.openxmlformats.org/drawingml/2006/main" xmlns:r="http://schemas.openxmlformats.org/officeDocument/2006/relationships" xmlns:p="http://schemas.openxmlformats.org/presentationml/2006/main">
+  <p:cSld>
+    <p:spTree>
+      <p:nvGrpSpPr>
+        <p:cNvPr id="1" name=""/>
+        <p:cNvGrpSpPr/>
+        <p:nvPr/>
+      </p:nvGrpSpPr>
+      <p:grpSpPr>
+        <a:xfrm>
+          <a:off x="0" y="0"/>
+          <a:ext cx="0" cy="0"/>
+          <a:chOff x="0" y="0"/>
+          <a:chExt cx="0" cy="0"/>
+        </a:xfrm>
+      </p:grpSpPr>
+      <p:sp>
+        <p:nvSpPr>
+          <p:cNvPr id="75778" name="Text Box 2"/>
+          <p:cNvSpPr txBox="1">
+            <a:spLocks noChangeArrowheads="1"/>
+          </p:cNvSpPr>
+          <p:nvPr/>
+        </p:nvSpPr>
+        <p:spPr bwMode="auto">
+          <a:xfrm>
+            <a:off x="4243389" y="1676401"/>
+            <a:ext cx="1735137" cy="2378075"/>
+          </a:xfrm>
+          <a:prstGeom prst="rect">
+            <a:avLst/>
+          </a:prstGeom>
+          <a:noFill/>
+          <a:ln w="9525">
+            <a:noFill/>
+            <a:miter lim="800000"/>
+            <a:headEnd/>
+            <a:tailEnd/>
+          </a:ln>
+        </p:spPr>
+        <p:txBody>
+          <a:bodyPr>
+            <a:spAutoFit/>
+          </a:bodyPr>
+          <a:lstStyle/>
+          <a:p>
+            <a:pPr>
+              <a:spcBef>
+                <a:spcPct val="50000"/>
+              </a:spcBef>
+            </a:pPr>
+            <a:r>
+              <a:rPr lang="en-US" sz="15000" b="1">
+                <a:latin typeface="Tahoma" pitchFamily="34" charset="0"/>
+              </a:rPr>
+              <a:t>Q</a:t>
+            </a:r>
+          </a:p>
+        </p:txBody>
+      </p:sp>
+      <p:sp>
+        <p:nvSpPr>
+          <p:cNvPr id="75779" name="Text Box 3"/>
+          <p:cNvSpPr txBox="1">
+            <a:spLocks noChangeArrowheads="1"/>
+          </p:cNvSpPr>
+          <p:nvPr/>
+        </p:nvSpPr>
+        <p:spPr bwMode="auto">
+          <a:xfrm>
+            <a:off x="6054725" y="2044701"/>
+            <a:ext cx="1735138" cy="2378075"/>
+          </a:xfrm>
+          <a:prstGeom prst="rect">
+            <a:avLst/>
+          </a:prstGeom>
+          <a:noFill/>
+          <a:ln w="9525">
+            <a:noFill/>
+            <a:miter lim="800000"/>
+            <a:headEnd/>
+            <a:tailEnd/>
+          </a:ln>
+        </p:spPr>
+        <p:txBody>
+          <a:bodyPr>
+            <a:spAutoFit/>
+          </a:bodyPr>
+          <a:lstStyle/>
+          <a:p>
+            <a:pPr>
+              <a:spcBef>
+                <a:spcPct val="50000"/>
+              </a:spcBef>
+            </a:pPr>
+            <a:r>
+              <a:rPr lang="en-US" sz="15000" b="1" dirty="0">
+                <a:latin typeface="Tahoma" pitchFamily="34" charset="0"/>
+              </a:rPr>
+              <a:t>A</a:t>
+            </a:r>
+          </a:p>
+        </p:txBody>
+      </p:sp>
+      <p:sp>
+        <p:nvSpPr>
+          <p:cNvPr id="75780" name="Text Box 4"/>
+          <p:cNvSpPr txBox="1">
+            <a:spLocks noChangeArrowheads="1"/>
+          </p:cNvSpPr>
+          <p:nvPr/>
+        </p:nvSpPr>
+        <p:spPr bwMode="auto">
+          <a:xfrm>
+            <a:off x="5334000" y="2679701"/>
+            <a:ext cx="1735138" cy="1616075"/>
+          </a:xfrm>
+          <a:prstGeom prst="rect">
+            <a:avLst/>
+          </a:prstGeom>
+          <a:noFill/>
+          <a:ln w="9525">
+            <a:noFill/>
+            <a:miter lim="800000"/>
+            <a:headEnd/>
+            <a:tailEnd/>
+          </a:ln>
+        </p:spPr>
+        <p:txBody>
+          <a:bodyPr>
+            <a:spAutoFit/>
+          </a:bodyPr>
+          <a:lstStyle/>
+          <a:p>
+            <a:pPr>
+              <a:spcBef>
+                <a:spcPct val="50000"/>
+              </a:spcBef>
+            </a:pPr>
+            <a:r>
+              <a:rPr lang="en-US" sz="10000" b="1">
+                <a:latin typeface="Tahoma" pitchFamily="34" charset="0"/>
+              </a:rPr>
+              <a:t>&amp;</a:t>
+            </a:r>
+            <a:endParaRPr lang="en-US" sz="15000" b="1">
+              <a:latin typeface="Tahoma" pitchFamily="34" charset="0"/>
+            </a:endParaRPr>
+          </a:p>
+        </p:txBody>
+      </p:sp>
+    </p:spTree>
+    <p:extLst>
+      <p:ext uri="{BB962C8B-B14F-4D97-AF65-F5344CB8AC3E}">
+        <p14:creationId xmlns:p14="http://schemas.microsoft.com/office/powerpoint/2010/main" val="1504473402"/>
+      </p:ext>
+    </p:extLst>
+  </p:cSld>
+  <p:clrMapOvr>
+    <a:masterClrMapping/>
+  </p:clrMapOvr>
+  <p:timing>
+    <p:tnLst>
+      <p:par>
+        <p:cTn id="1" dur="indefinite" restart="never" nodeType="tmRoot">
+          <p:childTnLst>
+            <p:seq concurrent="1" nextAc="seek">
+              <p:cTn id="2" dur="indefinite" nodeType="mainSeq">
+                <p:childTnLst>
+                  <p:par>
+                    <p:cTn id="3" fill="hold">
+                      <p:stCondLst>
+                        <p:cond delay="indefinite"/>
+                        <p:cond evt="onBegin" delay="0">
+                          <p:tn val="2"/>
+                        </p:cond>
+                      </p:stCondLst>
+                      <p:childTnLst>
+                        <p:par>
+                          <p:cTn id="4" fill="hold">
+                            <p:stCondLst>
+                              <p:cond delay="0"/>
+                            </p:stCondLst>
+                            <p:childTnLst>
+                              <p:par>
+                                <p:cTn id="5" presetID="2" presetClass="entr" presetSubtype="9" fill="hold" grpId="0" nodeType="afterEffect">
+                                  <p:stCondLst>
+                                    <p:cond delay="500"/>
+                                  </p:stCondLst>
+                                  <p:childTnLst>
+                                    <p:set>
+                                      <p:cBhvr>
+                                        <p:cTn id="6" dur="1" fill="hold">
+                                          <p:stCondLst>
+                                            <p:cond delay="0"/>
+                                          </p:stCondLst>
+                                        </p:cTn>
+                                        <p:tgtEl>
+                                          <p:spTgt spid="75778"/>
+                                        </p:tgtEl>
+                                        <p:attrNameLst>
+                                          <p:attrName>style.visibility</p:attrName>
+                                        </p:attrNameLst>
+                                      </p:cBhvr>
+                                      <p:to>
+                                        <p:strVal val="visible"/>
+                                      </p:to>
+                                    </p:set>
+                                    <p:anim calcmode="lin" valueType="num">
+                                      <p:cBhvr additive="base">
+                                        <p:cTn id="7" dur="500" fill="hold"/>
+                                        <p:tgtEl>
+                                          <p:spTgt spid="75778"/>
+                                        </p:tgtEl>
+                                        <p:attrNameLst>
+                                          <p:attrName>ppt_x</p:attrName>
+                                        </p:attrNameLst>
+                                      </p:cBhvr>
+                                      <p:tavLst>
+                                        <p:tav tm="0">
+                                          <p:val>
+                                            <p:strVal val="0-#ppt_w/2"/>
+                                          </p:val>
+                                        </p:tav>
+                                        <p:tav tm="100000">
+                                          <p:val>
+                                            <p:strVal val="#ppt_x"/>
+                                          </p:val>
+                                        </p:tav>
+                                      </p:tavLst>
+                                    </p:anim>
+                                    <p:anim calcmode="lin" valueType="num">
+                                      <p:cBhvr additive="base">
+                                        <p:cTn id="8" dur="500" fill="hold"/>
+                                        <p:tgtEl>
+                                          <p:spTgt spid="75778"/>
+                                        </p:tgtEl>
+                                        <p:attrNameLst>
+                                          <p:attrName>ppt_y</p:attrName>
+                                        </p:attrNameLst>
+                                      </p:cBhvr>
+                                      <p:tavLst>
+                                        <p:tav tm="0">
+                                          <p:val>
+                                            <p:strVal val="0-#ppt_h/2"/>
+                                          </p:val>
+                                        </p:tav>
+                                        <p:tav tm="100000">
+                                          <p:val>
+                                            <p:strVal val="#ppt_y"/>
+                                          </p:val>
+                                        </p:tav>
+                                      </p:tavLst>
+                                    </p:anim>
+                                  </p:childTnLst>
+                                </p:cTn>
+                              </p:par>
+                            </p:childTnLst>
+                          </p:cTn>
+                        </p:par>
+                        <p:par>
+                          <p:cTn id="9" fill="hold">
+                            <p:stCondLst>
+                              <p:cond delay="1000"/>
+                            </p:stCondLst>
+                            <p:childTnLst>
+                              <p:par>
+                                <p:cTn id="10" presetID="2" presetClass="entr" presetSubtype="4" fill="hold" grpId="0" nodeType="afterEffect">
+                                  <p:stCondLst>
+                                    <p:cond delay="0"/>
+                                  </p:stCondLst>
+                                  <p:childTnLst>
+                                    <p:set>
+                                      <p:cBhvr>
+                                        <p:cTn id="11" dur="1" fill="hold">
+                                          <p:stCondLst>
+                                            <p:cond delay="0"/>
+                                          </p:stCondLst>
+                                        </p:cTn>
+                                        <p:tgtEl>
+                                          <p:spTgt spid="75780"/>
+                                        </p:tgtEl>
+                                        <p:attrNameLst>
+                                          <p:attrName>style.visibility</p:attrName>
+                                        </p:attrNameLst>
+                                      </p:cBhvr>
+                                      <p:to>
+                                        <p:strVal val="visible"/>
+                                      </p:to>
+                                    </p:set>
+                                    <p:anim calcmode="lin" valueType="num">
+                                      <p:cBhvr additive="base">
+                                        <p:cTn id="12" dur="500" fill="hold"/>
+                                        <p:tgtEl>
+                                          <p:spTgt spid="75780"/>
+                                        </p:tgtEl>
+                                        <p:attrNameLst>
+                                          <p:attrName>ppt_x</p:attrName>
+                                        </p:attrNameLst>
+                                      </p:cBhvr>
+                                      <p:tavLst>
+                                        <p:tav tm="0">
+                                          <p:val>
+                                            <p:strVal val="#ppt_x"/>
+                                          </p:val>
+                                        </p:tav>
+                                        <p:tav tm="100000">
+                                          <p:val>
+                                            <p:strVal val="#ppt_x"/>
+                                          </p:val>
+                                        </p:tav>
+                                      </p:tavLst>
+                                    </p:anim>
+                                    <p:anim calcmode="lin" valueType="num">
+                                      <p:cBhvr additive="base">
+                                        <p:cTn id="13" dur="500" fill="hold"/>
+                                        <p:tgtEl>
+                                          <p:spTgt spid="75780"/>
+                                        </p:tgtEl>
+                                        <p:attrNameLst>
+                                          <p:attrName>ppt_y</p:attrName>
+                                        </p:attrNameLst>
+                                      </p:cBhvr>
+                                      <p:tavLst>
+                                        <p:tav tm="0">
+                                          <p:val>
+                                            <p:strVal val="1+#ppt_h/2"/>
+                                          </p:val>
+                                        </p:tav>
+                                        <p:tav tm="100000">
+                                          <p:val>
+                                            <p:strVal val="#ppt_y"/>
+                                          </p:val>
+                                        </p:tav>
+                                      </p:tavLst>
+                                    </p:anim>
+                                  </p:childTnLst>
+                                </p:cTn>
+                              </p:par>
+                            </p:childTnLst>
+                          </p:cTn>
+                        </p:par>
+                        <p:par>
+                          <p:cTn id="14" fill="hold">
+                            <p:stCondLst>
+                              <p:cond delay="1500"/>
+                            </p:stCondLst>
+                            <p:childTnLst>
+                              <p:par>
+                                <p:cTn id="15" presetID="2" presetClass="entr" presetSubtype="6" fill="hold" grpId="0" nodeType="afterEffect">
+                                  <p:stCondLst>
+                                    <p:cond delay="0"/>
+                                  </p:stCondLst>
+                                  <p:childTnLst>
+                                    <p:set>
+                                      <p:cBhvr>
+                                        <p:cTn id="16" dur="1" fill="hold">
+                                          <p:stCondLst>
+                                            <p:cond delay="0"/>
+                                          </p:stCondLst>
+                                        </p:cTn>
+                                        <p:tgtEl>
+                                          <p:spTgt spid="75779"/>
+                                        </p:tgtEl>
+                                        <p:attrNameLst>
+                                          <p:attrName>style.visibility</p:attrName>
+                                        </p:attrNameLst>
+                                      </p:cBhvr>
+                                      <p:to>
+                                        <p:strVal val="visible"/>
+                                      </p:to>
+                                    </p:set>
+                                    <p:anim calcmode="lin" valueType="num">
+                                      <p:cBhvr additive="base">
+                                        <p:cTn id="17" dur="500" fill="hold"/>
+                                        <p:tgtEl>
+                                          <p:spTgt spid="75779"/>
+                                        </p:tgtEl>
+                                        <p:attrNameLst>
+                                          <p:attrName>ppt_x</p:attrName>
+                                        </p:attrNameLst>
+                                      </p:cBhvr>
+                                      <p:tavLst>
+                                        <p:tav tm="0">
+                                          <p:val>
+                                            <p:strVal val="1+#ppt_w/2"/>
+                                          </p:val>
+                                        </p:tav>
+                                        <p:tav tm="100000">
+                                          <p:val>
+                                            <p:strVal val="#ppt_x"/>
+                                          </p:val>
+                                        </p:tav>
+                                      </p:tavLst>
+                                    </p:anim>
+                                    <p:anim calcmode="lin" valueType="num">
+                                      <p:cBhvr additive="base">
+                                        <p:cTn id="18" dur="500" fill="hold"/>
+                                        <p:tgtEl>
+                                          <p:spTgt spid="75779"/>
+                                        </p:tgtEl>
+                                        <p:attrNameLst>
+                                          <p:attrName>ppt_y</p:attrName>
+                                        </p:attrNameLst>
+                                      </p:cBhvr>
+                                      <p:tavLst>
+                                        <p:tav tm="0">
+                                          <p:val>
+                                            <p:strVal val="1+#ppt_h/2"/>
+                                          </p:val>
+                                        </p:tav>
+                                        <p:tav tm="100000">
+                                          <p:val>
+                                            <p:strVal val="#ppt_y"/>
+                                          </p:val>
+                                        </p:tav>
+                                      </p:tavLst>
+                                    </p:anim>
+                                  </p:childTnLst>
+                                </p:cTn>
+                              </p:par>
+                            </p:childTnLst>
+                          </p:cTn>
+                        </p:par>
+                      </p:childTnLst>
+                    </p:cTn>
+                  </p:par>
+                </p:childTnLst>
+              </p:cTn>
+              <p:prevCondLst>
+                <p:cond evt="onPrev" delay="0">
+                  <p:tgtEl>
+                    <p:sldTgt/>
+                  </p:tgtEl>
+                </p:cond>
+              </p:prevCondLst>
+              <p:nextCondLst>
+                <p:cond evt="onNext" delay="0">
+                  <p:tgtEl>
+                    <p:sldTgt/>
+                  </p:tgtEl>
+                </p:cond>
+              </p:nextCondLst>
+            </p:seq>
+          </p:childTnLst>
+        </p:cTn>
+      </p:par>
+    </p:tnLst>
+    <p:bldLst>
+      <p:bldP spid="75778" grpId="0" autoUpdateAnimBg="0"/>
+      <p:bldP spid="75779" grpId="0" autoUpdateAnimBg="0"/>
+      <p:bldP spid="75780" grpId="0" autoUpdateAnimBg="0"/>
+    </p:bldLst>
+  </p:timing>
+</p:sld>
+</file>
+
 <file path=ppt/theme/theme1.xml><?xml version="1.0" encoding="utf-8"?>
 <a:theme xmlns:a="http://schemas.openxmlformats.org/drawingml/2006/main" name="Office Theme">
   <a:themeElements>
@@ -3300,4 +4209,265 @@
     </a:ext>
   </a:extLst>
 </a:theme>
+</file>
+
+<file path=ppt/theme/theme2.xml><?xml version="1.0" encoding="utf-8"?>
+<a:theme xmlns:a="http://schemas.openxmlformats.org/drawingml/2006/main" name="Office Theme">
+  <a:themeElements>
+    <a:clrScheme name="Office">
+      <a:dk1>
+        <a:sysClr val="windowText" lastClr="000000"/>
+      </a:dk1>
+      <a:lt1>
+        <a:sysClr val="window" lastClr="FFFFFF"/>
+      </a:lt1>
+      <a:dk2>
+        <a:srgbClr val="44546A"/>
+      </a:dk2>
+      <a:lt2>
+        <a:srgbClr val="E7E6E6"/>
+      </a:lt2>
+      <a:accent1>
+        <a:srgbClr val="5B9BD5"/>
+      </a:accent1>
+      <a:accent2>
+        <a:srgbClr val="ED7D31"/>
+      </a:accent2>
+      <a:accent3>
+        <a:srgbClr val="A5A5A5"/>
+      </a:accent3>
+      <a:accent4>
+        <a:srgbClr val="FFC000"/>
+      </a:accent4>
+      <a:accent5>
+        <a:srgbClr val="4472C4"/>
+      </a:accent5>
+      <a:accent6>
+        <a:srgbClr val="70AD47"/>
+      </a:accent6>
+      <a:hlink>
+        <a:srgbClr val="0563C1"/>
+      </a:hlink>
+      <a:folHlink>
+        <a:srgbClr val="954F72"/>
+      </a:folHlink>
+    </a:clrScheme>
+    <a:fontScheme name="Office">
+      <a:majorFont>
+        <a:latin typeface="Calibri Light" panose="020F0302020204030204"/>
+        <a:ea typeface=""/>
+        <a:cs typeface=""/>
+        <a:font script="Jpan" typeface="ＭＳ Ｐゴシック"/>
+        <a:font script="Hang" typeface="맑은 고딕"/>
+        <a:font script="Hans" typeface="宋体"/>
+        <a:font script="Hant" typeface="新細明體"/>
+        <a:font script="Arab" typeface="Times New Roman"/>
+        <a:font script="Hebr" typeface="Times New Roman"/>
+        <a:font script="Thai" typeface="Angsana New"/>
+        <a:font script="Ethi" typeface="Nyala"/>
+        <a:font script="Beng" typeface="Vrinda"/>
+        <a:font script="Gujr" typeface="Shruti"/>
+        <a:font script="Khmr" typeface="MoolBoran"/>
+        <a:font script="Knda" typeface="Tunga"/>
+        <a:font script="Guru" typeface="Raavi"/>
+        <a:font script="Cans" typeface="Euphemia"/>
+        <a:font script="Cher" typeface="Plantagenet Cherokee"/>
+        <a:font script="Yiii" typeface="Microsoft Yi Baiti"/>
+        <a:font script="Tibt" typeface="Microsoft Himalaya"/>
+        <a:font script="Thaa" typeface="MV Boli"/>
+        <a:font script="Deva" typeface="Mangal"/>
+        <a:font script="Telu" typeface="Gautami"/>
+        <a:font script="Taml" typeface="Latha"/>
+        <a:font script="Syrc" typeface="Estrangelo Edessa"/>
+        <a:font script="Orya" typeface="Kalinga"/>
+        <a:font script="Mlym" typeface="Kartika"/>
+        <a:font script="Laoo" typeface="DokChampa"/>
+        <a:font script="Sinh" typeface="Iskoola Pota"/>
+        <a:font script="Mong" typeface="Mongolian Baiti"/>
+        <a:font script="Viet" typeface="Times New Roman"/>
+        <a:font script="Uigh" typeface="Microsoft Uighur"/>
+        <a:font script="Geor" typeface="Sylfaen"/>
+      </a:majorFont>
+      <a:minorFont>
+        <a:latin typeface="Calibri" panose="020F0502020204030204"/>
+        <a:ea typeface=""/>
+        <a:cs typeface=""/>
+        <a:font script="Jpan" typeface="ＭＳ Ｐゴシック"/>
+        <a:font script="Hang" typeface="맑은 고딕"/>
+        <a:font script="Hans" typeface="宋体"/>
+        <a:font script="Hant" typeface="新細明體"/>
+        <a:font script="Arab" typeface="Arial"/>
+        <a:font script="Hebr" typeface="Arial"/>
+        <a:font script="Thai" typeface="Cordia New"/>
+        <a:font script="Ethi" typeface="Nyala"/>
+        <a:font script="Beng" typeface="Vrinda"/>
+        <a:font script="Gujr" typeface="Shruti"/>
+        <a:font script="Khmr" typeface="DaunPenh"/>
+        <a:font script="Knda" typeface="Tunga"/>
+        <a:font script="Guru" typeface="Raavi"/>
+        <a:font script="Cans" typeface="Euphemia"/>
+        <a:font script="Cher" typeface="Plantagenet Cherokee"/>
+        <a:font script="Yiii" typeface="Microsoft Yi Baiti"/>
+        <a:font script="Tibt" typeface="Microsoft Himalaya"/>
+        <a:font script="Thaa" typeface="MV Boli"/>
+        <a:font script="Deva" typeface="Mangal"/>
+        <a:font script="Telu" typeface="Gautami"/>
+        <a:font script="Taml" typeface="Latha"/>
+        <a:font script="Syrc" typeface="Estrangelo Edessa"/>
+        <a:font script="Orya" typeface="Kalinga"/>
+        <a:font script="Mlym" typeface="Kartika"/>
+        <a:font script="Laoo" typeface="DokChampa"/>
+        <a:font script="Sinh" typeface="Iskoola Pota"/>
+        <a:font script="Mong" typeface="Mongolian Baiti"/>
+        <a:font script="Viet" typeface="Arial"/>
+        <a:font script="Uigh" typeface="Microsoft Uighur"/>
+        <a:font script="Geor" typeface="Sylfaen"/>
+      </a:minorFont>
+    </a:fontScheme>
+    <a:fmtScheme name="Office">
+      <a:fillStyleLst>
+        <a:solidFill>
+          <a:schemeClr val="phClr"/>
+        </a:solidFill>
+        <a:gradFill rotWithShape="1">
+          <a:gsLst>
+            <a:gs pos="0">
+              <a:schemeClr val="phClr">
+                <a:lumMod val="110000"/>
+                <a:satMod val="105000"/>
+                <a:tint val="67000"/>
+              </a:schemeClr>
+            </a:gs>
+            <a:gs pos="50000">
+              <a:schemeClr val="phClr">
+                <a:lumMod val="105000"/>
+                <a:satMod val="103000"/>
+                <a:tint val="73000"/>
+              </a:schemeClr>
+            </a:gs>
+            <a:gs pos="100000">
+              <a:schemeClr val="phClr">
+                <a:lumMod val="105000"/>
+                <a:satMod val="109000"/>
+                <a:tint val="81000"/>
+              </a:schemeClr>
+            </a:gs>
+          </a:gsLst>
+          <a:lin ang="5400000" scaled="0"/>
+        </a:gradFill>
+        <a:gradFill rotWithShape="1">
+          <a:gsLst>
+            <a:gs pos="0">
+              <a:schemeClr val="phClr">
+                <a:satMod val="103000"/>
+                <a:lumMod val="102000"/>
+                <a:tint val="94000"/>
+              </a:schemeClr>
+            </a:gs>
+            <a:gs pos="50000">
+              <a:schemeClr val="phClr">
+                <a:satMod val="110000"/>
+                <a:lumMod val="100000"/>
+                <a:shade val="100000"/>
+              </a:schemeClr>
+            </a:gs>
+            <a:gs pos="100000">
+              <a:schemeClr val="phClr">
+                <a:lumMod val="99000"/>
+                <a:satMod val="120000"/>
+                <a:shade val="78000"/>
+              </a:schemeClr>
+            </a:gs>
+          </a:gsLst>
+          <a:lin ang="5400000" scaled="0"/>
+        </a:gradFill>
+      </a:fillStyleLst>
+      <a:lnStyleLst>
+        <a:ln w="6350" cap="flat" cmpd="sng" algn="ctr">
+          <a:solidFill>
+            <a:schemeClr val="phClr"/>
+          </a:solidFill>
+          <a:prstDash val="solid"/>
+          <a:miter lim="800000"/>
+        </a:ln>
+        <a:ln w="12700" cap="flat" cmpd="sng" algn="ctr">
+          <a:solidFill>
+            <a:schemeClr val="phClr"/>
+          </a:solidFill>
+          <a:prstDash val="solid"/>
+          <a:miter lim="800000"/>
+        </a:ln>
+        <a:ln w="19050" cap="flat" cmpd="sng" algn="ctr">
+          <a:solidFill>
+            <a:schemeClr val="phClr"/>
+          </a:solidFill>
+          <a:prstDash val="solid"/>
+          <a:miter lim="800000"/>
+        </a:ln>
+      </a:lnStyleLst>
+      <a:effectStyleLst>
+        <a:effectStyle>
+          <a:effectLst/>
+        </a:effectStyle>
+        <a:effectStyle>
+          <a:effectLst/>
+        </a:effectStyle>
+        <a:effectStyle>
+          <a:effectLst>
+            <a:outerShdw blurRad="57150" dist="19050" dir="5400000" algn="ctr" rotWithShape="0">
+              <a:srgbClr val="000000">
+                <a:alpha val="63000"/>
+              </a:srgbClr>
+            </a:outerShdw>
+          </a:effectLst>
+        </a:effectStyle>
+      </a:effectStyleLst>
+      <a:bgFillStyleLst>
+        <a:solidFill>
+          <a:schemeClr val="phClr"/>
+        </a:solidFill>
+        <a:solidFill>
+          <a:schemeClr val="phClr">
+            <a:tint val="95000"/>
+            <a:satMod val="170000"/>
+          </a:schemeClr>
+        </a:solidFill>
+        <a:gradFill rotWithShape="1">
+          <a:gsLst>
+            <a:gs pos="0">
+              <a:schemeClr val="phClr">
+                <a:tint val="93000"/>
+                <a:satMod val="150000"/>
+                <a:shade val="98000"/>
+                <a:lumMod val="102000"/>
+              </a:schemeClr>
+            </a:gs>
+            <a:gs pos="50000">
+              <a:schemeClr val="phClr">
+                <a:tint val="98000"/>
+                <a:satMod val="130000"/>
+                <a:shade val="90000"/>
+                <a:lumMod val="103000"/>
+              </a:schemeClr>
+            </a:gs>
+            <a:gs pos="100000">
+              <a:schemeClr val="phClr">
+                <a:shade val="63000"/>
+                <a:satMod val="120000"/>
+              </a:schemeClr>
+            </a:gs>
+          </a:gsLst>
+          <a:lin ang="5400000" scaled="0"/>
+        </a:gradFill>
+      </a:bgFillStyleLst>
+    </a:fmtScheme>
+  </a:themeElements>
+  <a:objectDefaults/>
+  <a:extraClrSchemeLst/>
+  <a:extLst>
+    <a:ext uri="{05A4C25C-085E-4340-85A3-A5531E510DB2}">
+      <thm15:themeFamily xmlns:thm15="http://schemas.microsoft.com/office/thememl/2012/main" name="Office Theme" id="{62F939B6-93AF-4DB8-9C6B-D6C7DFDC589F}" vid="{4A3C46E8-61CC-4603-A589-7422A47A8E4A}"/>
+    </a:ext>
+  </a:extLst>
+</a:theme>
 </file>
</xml_diff>

<commit_message>
Added titles to the slides ill be covering.
</commit_message>
<xml_diff>
--- a/Presentation.pptx
+++ b/Presentation.pptx
@@ -5,11 +5,17 @@
     <p:sldMasterId id="2147483648" r:id="rId1"/>
   </p:sldMasterIdLst>
   <p:notesMasterIdLst>
-    <p:notesMasterId r:id="rId4"/>
+    <p:notesMasterId r:id="rId10"/>
   </p:notesMasterIdLst>
   <p:sldIdLst>
     <p:sldId id="256" r:id="rId2"/>
-    <p:sldId id="258" r:id="rId3"/>
+    <p:sldId id="259" r:id="rId3"/>
+    <p:sldId id="260" r:id="rId4"/>
+    <p:sldId id="261" r:id="rId5"/>
+    <p:sldId id="262" r:id="rId6"/>
+    <p:sldId id="263" r:id="rId7"/>
+    <p:sldId id="264" r:id="rId8"/>
+    <p:sldId id="258" r:id="rId9"/>
   </p:sldIdLst>
   <p:sldSz cx="12192000" cy="6858000"/>
   <p:notesSz cx="6858000" cy="9144000"/>
@@ -539,7 +545,7 @@
             <a:fld id="{2BAF69FA-8F2D-41D5-BC73-0469DBD37D74}" type="slidenum">
               <a:rPr lang="en-US"/>
               <a:pPr/>
-              <a:t>2</a:t>
+              <a:t>8</a:t>
             </a:fld>
             <a:endParaRPr lang="en-US"/>
           </a:p>
@@ -689,7 +695,7 @@
           <a:p>
             <a:fld id="{73ABFF92-7924-405A-9F38-D41891E0DC1D}" type="datetimeFigureOut">
               <a:rPr lang="en-US" smtClean="0"/>
-              <a:t>4/23/2016</a:t>
+              <a:t>4/24/2016</a:t>
             </a:fld>
             <a:endParaRPr lang="en-US"/>
           </a:p>
@@ -859,7 +865,7 @@
           <a:p>
             <a:fld id="{73ABFF92-7924-405A-9F38-D41891E0DC1D}" type="datetimeFigureOut">
               <a:rPr lang="en-US" smtClean="0"/>
-              <a:t>4/23/2016</a:t>
+              <a:t>4/24/2016</a:t>
             </a:fld>
             <a:endParaRPr lang="en-US"/>
           </a:p>
@@ -1039,7 +1045,7 @@
           <a:p>
             <a:fld id="{73ABFF92-7924-405A-9F38-D41891E0DC1D}" type="datetimeFigureOut">
               <a:rPr lang="en-US" smtClean="0"/>
-              <a:t>4/23/2016</a:t>
+              <a:t>4/24/2016</a:t>
             </a:fld>
             <a:endParaRPr lang="en-US"/>
           </a:p>
@@ -1209,7 +1215,7 @@
           <a:p>
             <a:fld id="{73ABFF92-7924-405A-9F38-D41891E0DC1D}" type="datetimeFigureOut">
               <a:rPr lang="en-US" smtClean="0"/>
-              <a:t>4/23/2016</a:t>
+              <a:t>4/24/2016</a:t>
             </a:fld>
             <a:endParaRPr lang="en-US"/>
           </a:p>
@@ -1455,7 +1461,7 @@
           <a:p>
             <a:fld id="{73ABFF92-7924-405A-9F38-D41891E0DC1D}" type="datetimeFigureOut">
               <a:rPr lang="en-US" smtClean="0"/>
-              <a:t>4/23/2016</a:t>
+              <a:t>4/24/2016</a:t>
             </a:fld>
             <a:endParaRPr lang="en-US"/>
           </a:p>
@@ -1687,7 +1693,7 @@
           <a:p>
             <a:fld id="{73ABFF92-7924-405A-9F38-D41891E0DC1D}" type="datetimeFigureOut">
               <a:rPr lang="en-US" smtClean="0"/>
-              <a:t>4/23/2016</a:t>
+              <a:t>4/24/2016</a:t>
             </a:fld>
             <a:endParaRPr lang="en-US"/>
           </a:p>
@@ -2054,7 +2060,7 @@
           <a:p>
             <a:fld id="{73ABFF92-7924-405A-9F38-D41891E0DC1D}" type="datetimeFigureOut">
               <a:rPr lang="en-US" smtClean="0"/>
-              <a:t>4/23/2016</a:t>
+              <a:t>4/24/2016</a:t>
             </a:fld>
             <a:endParaRPr lang="en-US"/>
           </a:p>
@@ -2172,7 +2178,7 @@
           <a:p>
             <a:fld id="{73ABFF92-7924-405A-9F38-D41891E0DC1D}" type="datetimeFigureOut">
               <a:rPr lang="en-US" smtClean="0"/>
-              <a:t>4/23/2016</a:t>
+              <a:t>4/24/2016</a:t>
             </a:fld>
             <a:endParaRPr lang="en-US"/>
           </a:p>
@@ -2267,7 +2273,7 @@
           <a:p>
             <a:fld id="{73ABFF92-7924-405A-9F38-D41891E0DC1D}" type="datetimeFigureOut">
               <a:rPr lang="en-US" smtClean="0"/>
-              <a:t>4/23/2016</a:t>
+              <a:t>4/24/2016</a:t>
             </a:fld>
             <a:endParaRPr lang="en-US"/>
           </a:p>
@@ -2544,7 +2550,7 @@
           <a:p>
             <a:fld id="{73ABFF92-7924-405A-9F38-D41891E0DC1D}" type="datetimeFigureOut">
               <a:rPr lang="en-US" smtClean="0"/>
-              <a:t>4/23/2016</a:t>
+              <a:t>4/24/2016</a:t>
             </a:fld>
             <a:endParaRPr lang="en-US"/>
           </a:p>
@@ -2797,7 +2803,7 @@
           <a:p>
             <a:fld id="{73ABFF92-7924-405A-9F38-D41891E0DC1D}" type="datetimeFigureOut">
               <a:rPr lang="en-US" smtClean="0"/>
-              <a:t>4/23/2016</a:t>
+              <a:t>4/24/2016</a:t>
             </a:fld>
             <a:endParaRPr lang="en-US"/>
           </a:p>
@@ -3010,7 +3016,7 @@
           <a:p>
             <a:fld id="{73ABFF92-7924-405A-9F38-D41891E0DC1D}" type="datetimeFigureOut">
               <a:rPr lang="en-US" smtClean="0"/>
-              <a:t>4/23/2016</a:t>
+              <a:t>4/24/2016</a:t>
             </a:fld>
             <a:endParaRPr lang="en-US"/>
           </a:p>
@@ -3493,6 +3499,443 @@
 </file>
 
 <file path=ppt/slides/slide2.xml><?xml version="1.0" encoding="utf-8"?>
+<p:sld xmlns:a="http://schemas.openxmlformats.org/drawingml/2006/main" xmlns:r="http://schemas.openxmlformats.org/officeDocument/2006/relationships" xmlns:p="http://schemas.openxmlformats.org/presentationml/2006/main">
+  <p:cSld>
+    <p:spTree>
+      <p:nvGrpSpPr>
+        <p:cNvPr id="1" name=""/>
+        <p:cNvGrpSpPr/>
+        <p:nvPr/>
+      </p:nvGrpSpPr>
+      <p:grpSpPr>
+        <a:xfrm>
+          <a:off x="0" y="0"/>
+          <a:ext cx="0" cy="0"/>
+          <a:chOff x="0" y="0"/>
+          <a:chExt cx="0" cy="0"/>
+        </a:xfrm>
+      </p:grpSpPr>
+      <p:sp>
+        <p:nvSpPr>
+          <p:cNvPr id="2" name="Title 1"/>
+          <p:cNvSpPr>
+            <a:spLocks noGrp="1"/>
+          </p:cNvSpPr>
+          <p:nvPr>
+            <p:ph type="title"/>
+          </p:nvPr>
+        </p:nvSpPr>
+        <p:spPr/>
+        <p:txBody>
+          <a:bodyPr/>
+          <a:lstStyle/>
+          <a:p>
+            <a:pPr algn="ctr"/>
+            <a:r>
+              <a:rPr lang="en-US" dirty="0" smtClean="0"/>
+              <a:t>Custom Cards</a:t>
+            </a:r>
+            <a:endParaRPr lang="en-US" dirty="0"/>
+          </a:p>
+        </p:txBody>
+      </p:sp>
+      <p:sp>
+        <p:nvSpPr>
+          <p:cNvPr id="3" name="Content Placeholder 2"/>
+          <p:cNvSpPr>
+            <a:spLocks noGrp="1"/>
+          </p:cNvSpPr>
+          <p:nvPr>
+            <p:ph idx="1"/>
+          </p:nvPr>
+        </p:nvSpPr>
+        <p:spPr/>
+        <p:txBody>
+          <a:bodyPr/>
+          <a:lstStyle/>
+          <a:p>
+            <a:endParaRPr lang="en-US"/>
+          </a:p>
+        </p:txBody>
+      </p:sp>
+    </p:spTree>
+    <p:extLst>
+      <p:ext uri="{BB962C8B-B14F-4D97-AF65-F5344CB8AC3E}">
+        <p14:creationId xmlns:p14="http://schemas.microsoft.com/office/powerpoint/2010/main" val="1838582955"/>
+      </p:ext>
+    </p:extLst>
+  </p:cSld>
+  <p:clrMapOvr>
+    <a:masterClrMapping/>
+  </p:clrMapOvr>
+</p:sld>
+</file>
+
+<file path=ppt/slides/slide3.xml><?xml version="1.0" encoding="utf-8"?>
+<p:sld xmlns:a="http://schemas.openxmlformats.org/drawingml/2006/main" xmlns:r="http://schemas.openxmlformats.org/officeDocument/2006/relationships" xmlns:p="http://schemas.openxmlformats.org/presentationml/2006/main">
+  <p:cSld>
+    <p:spTree>
+      <p:nvGrpSpPr>
+        <p:cNvPr id="1" name=""/>
+        <p:cNvGrpSpPr/>
+        <p:nvPr/>
+      </p:nvGrpSpPr>
+      <p:grpSpPr>
+        <a:xfrm>
+          <a:off x="0" y="0"/>
+          <a:ext cx="0" cy="0"/>
+          <a:chOff x="0" y="0"/>
+          <a:chExt cx="0" cy="0"/>
+        </a:xfrm>
+      </p:grpSpPr>
+      <p:sp>
+        <p:nvSpPr>
+          <p:cNvPr id="2" name="Title 1"/>
+          <p:cNvSpPr>
+            <a:spLocks noGrp="1"/>
+          </p:cNvSpPr>
+          <p:nvPr>
+            <p:ph type="title"/>
+          </p:nvPr>
+        </p:nvSpPr>
+        <p:spPr/>
+        <p:txBody>
+          <a:bodyPr/>
+          <a:lstStyle/>
+          <a:p>
+            <a:pPr algn="ctr"/>
+            <a:r>
+              <a:rPr lang="en-US" dirty="0" smtClean="0"/>
+              <a:t>Lists in Wear</a:t>
+            </a:r>
+            <a:endParaRPr lang="en-US" dirty="0"/>
+          </a:p>
+        </p:txBody>
+      </p:sp>
+      <p:sp>
+        <p:nvSpPr>
+          <p:cNvPr id="3" name="Content Placeholder 2"/>
+          <p:cNvSpPr>
+            <a:spLocks noGrp="1"/>
+          </p:cNvSpPr>
+          <p:nvPr>
+            <p:ph idx="1"/>
+          </p:nvPr>
+        </p:nvSpPr>
+        <p:spPr/>
+        <p:txBody>
+          <a:bodyPr/>
+          <a:lstStyle/>
+          <a:p>
+            <a:endParaRPr lang="en-US"/>
+          </a:p>
+        </p:txBody>
+      </p:sp>
+    </p:spTree>
+    <p:extLst>
+      <p:ext uri="{BB962C8B-B14F-4D97-AF65-F5344CB8AC3E}">
+        <p14:creationId xmlns:p14="http://schemas.microsoft.com/office/powerpoint/2010/main" val="2669957311"/>
+      </p:ext>
+    </p:extLst>
+  </p:cSld>
+  <p:clrMapOvr>
+    <a:masterClrMapping/>
+  </p:clrMapOvr>
+</p:sld>
+</file>
+
+<file path=ppt/slides/slide4.xml><?xml version="1.0" encoding="utf-8"?>
+<p:sld xmlns:a="http://schemas.openxmlformats.org/drawingml/2006/main" xmlns:r="http://schemas.openxmlformats.org/officeDocument/2006/relationships" xmlns:p="http://schemas.openxmlformats.org/presentationml/2006/main">
+  <p:cSld>
+    <p:spTree>
+      <p:nvGrpSpPr>
+        <p:cNvPr id="1" name=""/>
+        <p:cNvGrpSpPr/>
+        <p:nvPr/>
+      </p:nvGrpSpPr>
+      <p:grpSpPr>
+        <a:xfrm>
+          <a:off x="0" y="0"/>
+          <a:ext cx="0" cy="0"/>
+          <a:chOff x="0" y="0"/>
+          <a:chExt cx="0" cy="0"/>
+        </a:xfrm>
+      </p:grpSpPr>
+      <p:sp>
+        <p:nvSpPr>
+          <p:cNvPr id="2" name="Title 1"/>
+          <p:cNvSpPr>
+            <a:spLocks noGrp="1"/>
+          </p:cNvSpPr>
+          <p:nvPr>
+            <p:ph type="title"/>
+          </p:nvPr>
+        </p:nvSpPr>
+        <p:spPr/>
+        <p:txBody>
+          <a:bodyPr/>
+          <a:lstStyle/>
+          <a:p>
+            <a:pPr algn="ctr"/>
+            <a:r>
+              <a:rPr lang="en-US" dirty="0" smtClean="0"/>
+              <a:t>List Adapters</a:t>
+            </a:r>
+            <a:endParaRPr lang="en-US" dirty="0"/>
+          </a:p>
+        </p:txBody>
+      </p:sp>
+      <p:sp>
+        <p:nvSpPr>
+          <p:cNvPr id="3" name="Content Placeholder 2"/>
+          <p:cNvSpPr>
+            <a:spLocks noGrp="1"/>
+          </p:cNvSpPr>
+          <p:nvPr>
+            <p:ph idx="1"/>
+          </p:nvPr>
+        </p:nvSpPr>
+        <p:spPr/>
+        <p:txBody>
+          <a:bodyPr/>
+          <a:lstStyle/>
+          <a:p>
+            <a:endParaRPr lang="en-US"/>
+          </a:p>
+        </p:txBody>
+      </p:sp>
+    </p:spTree>
+    <p:extLst>
+      <p:ext uri="{BB962C8B-B14F-4D97-AF65-F5344CB8AC3E}">
+        <p14:creationId xmlns:p14="http://schemas.microsoft.com/office/powerpoint/2010/main" val="1979634976"/>
+      </p:ext>
+    </p:extLst>
+  </p:cSld>
+  <p:clrMapOvr>
+    <a:masterClrMapping/>
+  </p:clrMapOvr>
+</p:sld>
+</file>
+
+<file path=ppt/slides/slide5.xml><?xml version="1.0" encoding="utf-8"?>
+<p:sld xmlns:a="http://schemas.openxmlformats.org/drawingml/2006/main" xmlns:r="http://schemas.openxmlformats.org/officeDocument/2006/relationships" xmlns:p="http://schemas.openxmlformats.org/presentationml/2006/main">
+  <p:cSld>
+    <p:spTree>
+      <p:nvGrpSpPr>
+        <p:cNvPr id="1" name=""/>
+        <p:cNvGrpSpPr/>
+        <p:nvPr/>
+      </p:nvGrpSpPr>
+      <p:grpSpPr>
+        <a:xfrm>
+          <a:off x="0" y="0"/>
+          <a:ext cx="0" cy="0"/>
+          <a:chOff x="0" y="0"/>
+          <a:chExt cx="0" cy="0"/>
+        </a:xfrm>
+      </p:grpSpPr>
+      <p:sp>
+        <p:nvSpPr>
+          <p:cNvPr id="2" name="Title 1"/>
+          <p:cNvSpPr>
+            <a:spLocks noGrp="1"/>
+          </p:cNvSpPr>
+          <p:nvPr>
+            <p:ph type="title"/>
+          </p:nvPr>
+        </p:nvSpPr>
+        <p:spPr/>
+        <p:txBody>
+          <a:bodyPr/>
+          <a:lstStyle/>
+          <a:p>
+            <a:pPr algn="ctr"/>
+            <a:r>
+              <a:rPr lang="en-US" dirty="0" smtClean="0"/>
+              <a:t>Confirmations</a:t>
+            </a:r>
+            <a:endParaRPr lang="en-US" dirty="0"/>
+          </a:p>
+        </p:txBody>
+      </p:sp>
+      <p:sp>
+        <p:nvSpPr>
+          <p:cNvPr id="3" name="Content Placeholder 2"/>
+          <p:cNvSpPr>
+            <a:spLocks noGrp="1"/>
+          </p:cNvSpPr>
+          <p:nvPr>
+            <p:ph idx="1"/>
+          </p:nvPr>
+        </p:nvSpPr>
+        <p:spPr/>
+        <p:txBody>
+          <a:bodyPr/>
+          <a:lstStyle/>
+          <a:p>
+            <a:endParaRPr lang="en-US"/>
+          </a:p>
+        </p:txBody>
+      </p:sp>
+    </p:spTree>
+    <p:extLst>
+      <p:ext uri="{BB962C8B-B14F-4D97-AF65-F5344CB8AC3E}">
+        <p14:creationId xmlns:p14="http://schemas.microsoft.com/office/powerpoint/2010/main" val="2824081594"/>
+      </p:ext>
+    </p:extLst>
+  </p:cSld>
+  <p:clrMapOvr>
+    <a:masterClrMapping/>
+  </p:clrMapOvr>
+</p:sld>
+</file>
+
+<file path=ppt/slides/slide6.xml><?xml version="1.0" encoding="utf-8"?>
+<p:sld xmlns:a="http://schemas.openxmlformats.org/drawingml/2006/main" xmlns:r="http://schemas.openxmlformats.org/officeDocument/2006/relationships" xmlns:p="http://schemas.openxmlformats.org/presentationml/2006/main">
+  <p:cSld>
+    <p:spTree>
+      <p:nvGrpSpPr>
+        <p:cNvPr id="1" name=""/>
+        <p:cNvGrpSpPr/>
+        <p:nvPr/>
+      </p:nvGrpSpPr>
+      <p:grpSpPr>
+        <a:xfrm>
+          <a:off x="0" y="0"/>
+          <a:ext cx="0" cy="0"/>
+          <a:chOff x="0" y="0"/>
+          <a:chExt cx="0" cy="0"/>
+        </a:xfrm>
+      </p:grpSpPr>
+      <p:sp>
+        <p:nvSpPr>
+          <p:cNvPr id="2" name="Title 1"/>
+          <p:cNvSpPr>
+            <a:spLocks noGrp="1"/>
+          </p:cNvSpPr>
+          <p:nvPr>
+            <p:ph type="title"/>
+          </p:nvPr>
+        </p:nvSpPr>
+        <p:spPr/>
+        <p:txBody>
+          <a:bodyPr/>
+          <a:lstStyle/>
+          <a:p>
+            <a:pPr algn="ctr"/>
+            <a:r>
+              <a:rPr lang="en-US" dirty="0" smtClean="0"/>
+              <a:t>Auto Confirmation Timers</a:t>
+            </a:r>
+            <a:endParaRPr lang="en-US" dirty="0"/>
+          </a:p>
+        </p:txBody>
+      </p:sp>
+      <p:sp>
+        <p:nvSpPr>
+          <p:cNvPr id="3" name="Content Placeholder 2"/>
+          <p:cNvSpPr>
+            <a:spLocks noGrp="1"/>
+          </p:cNvSpPr>
+          <p:nvPr>
+            <p:ph idx="1"/>
+          </p:nvPr>
+        </p:nvSpPr>
+        <p:spPr/>
+        <p:txBody>
+          <a:bodyPr/>
+          <a:lstStyle/>
+          <a:p>
+            <a:endParaRPr lang="en-US"/>
+          </a:p>
+        </p:txBody>
+      </p:sp>
+    </p:spTree>
+    <p:extLst>
+      <p:ext uri="{BB962C8B-B14F-4D97-AF65-F5344CB8AC3E}">
+        <p14:creationId xmlns:p14="http://schemas.microsoft.com/office/powerpoint/2010/main" val="3664338538"/>
+      </p:ext>
+    </p:extLst>
+  </p:cSld>
+  <p:clrMapOvr>
+    <a:masterClrMapping/>
+  </p:clrMapOvr>
+</p:sld>
+</file>
+
+<file path=ppt/slides/slide7.xml><?xml version="1.0" encoding="utf-8"?>
+<p:sld xmlns:a="http://schemas.openxmlformats.org/drawingml/2006/main" xmlns:r="http://schemas.openxmlformats.org/officeDocument/2006/relationships" xmlns:p="http://schemas.openxmlformats.org/presentationml/2006/main">
+  <p:cSld>
+    <p:spTree>
+      <p:nvGrpSpPr>
+        <p:cNvPr id="1" name=""/>
+        <p:cNvGrpSpPr/>
+        <p:nvPr/>
+      </p:nvGrpSpPr>
+      <p:grpSpPr>
+        <a:xfrm>
+          <a:off x="0" y="0"/>
+          <a:ext cx="0" cy="0"/>
+          <a:chOff x="0" y="0"/>
+          <a:chExt cx="0" cy="0"/>
+        </a:xfrm>
+      </p:grpSpPr>
+      <p:sp>
+        <p:nvSpPr>
+          <p:cNvPr id="2" name="Title 1"/>
+          <p:cNvSpPr>
+            <a:spLocks noGrp="1"/>
+          </p:cNvSpPr>
+          <p:nvPr>
+            <p:ph type="title"/>
+          </p:nvPr>
+        </p:nvSpPr>
+        <p:spPr/>
+        <p:txBody>
+          <a:bodyPr/>
+          <a:lstStyle/>
+          <a:p>
+            <a:r>
+              <a:rPr lang="en-US" dirty="0" smtClean="0"/>
+              <a:t>				References</a:t>
+            </a:r>
+            <a:endParaRPr lang="en-US" dirty="0"/>
+          </a:p>
+        </p:txBody>
+      </p:sp>
+      <p:sp>
+        <p:nvSpPr>
+          <p:cNvPr id="3" name="Content Placeholder 2"/>
+          <p:cNvSpPr>
+            <a:spLocks noGrp="1"/>
+          </p:cNvSpPr>
+          <p:nvPr>
+            <p:ph idx="1"/>
+          </p:nvPr>
+        </p:nvSpPr>
+        <p:spPr/>
+        <p:txBody>
+          <a:bodyPr/>
+          <a:lstStyle/>
+          <a:p>
+            <a:endParaRPr lang="en-US" dirty="0"/>
+          </a:p>
+        </p:txBody>
+      </p:sp>
+    </p:spTree>
+    <p:extLst>
+      <p:ext uri="{BB962C8B-B14F-4D97-AF65-F5344CB8AC3E}">
+        <p14:creationId xmlns:p14="http://schemas.microsoft.com/office/powerpoint/2010/main" val="769568546"/>
+      </p:ext>
+    </p:extLst>
+  </p:cSld>
+  <p:clrMapOvr>
+    <a:masterClrMapping/>
+  </p:clrMapOvr>
+</p:sld>
+</file>
+
+<file path=ppt/slides/slide8.xml><?xml version="1.0" encoding="utf-8"?>
 <p:sld xmlns:a="http://schemas.openxmlformats.org/drawingml/2006/main" xmlns:r="http://schemas.openxmlformats.org/officeDocument/2006/relationships" xmlns:p="http://schemas.openxmlformats.org/presentationml/2006/main">
   <p:cSld>
     <p:spTree>

</xml_diff>

<commit_message>
Added everything I need for the Presentation
</commit_message>
<xml_diff>
--- a/Presentation.pptx
+++ b/Presentation.pptx
@@ -5,17 +5,19 @@
     <p:sldMasterId id="2147483648" r:id="rId1"/>
   </p:sldMasterIdLst>
   <p:notesMasterIdLst>
-    <p:notesMasterId r:id="rId10"/>
+    <p:notesMasterId r:id="rId12"/>
   </p:notesMasterIdLst>
   <p:sldIdLst>
     <p:sldId id="256" r:id="rId2"/>
-    <p:sldId id="259" r:id="rId3"/>
-    <p:sldId id="260" r:id="rId4"/>
-    <p:sldId id="261" r:id="rId5"/>
-    <p:sldId id="262" r:id="rId6"/>
-    <p:sldId id="263" r:id="rId7"/>
-    <p:sldId id="264" r:id="rId8"/>
-    <p:sldId id="258" r:id="rId9"/>
+    <p:sldId id="265" r:id="rId3"/>
+    <p:sldId id="259" r:id="rId4"/>
+    <p:sldId id="260" r:id="rId5"/>
+    <p:sldId id="261" r:id="rId6"/>
+    <p:sldId id="262" r:id="rId7"/>
+    <p:sldId id="263" r:id="rId8"/>
+    <p:sldId id="266" r:id="rId9"/>
+    <p:sldId id="264" r:id="rId10"/>
+    <p:sldId id="258" r:id="rId11"/>
   </p:sldIdLst>
   <p:sldSz cx="12192000" cy="6858000"/>
   <p:notesSz cx="6858000" cy="9144000"/>
@@ -268,38 +270,37 @@
           <a:p>
             <a:pPr lvl="0"/>
             <a:r>
-              <a:rPr lang="en-US" smtClean="0"/>
+              <a:rPr lang="en-US"/>
               <a:t>Click to edit Master text styles</a:t>
             </a:r>
           </a:p>
           <a:p>
             <a:pPr lvl="1"/>
             <a:r>
-              <a:rPr lang="en-US" smtClean="0"/>
+              <a:rPr lang="en-US"/>
               <a:t>Second level</a:t>
             </a:r>
           </a:p>
           <a:p>
             <a:pPr lvl="2"/>
             <a:r>
-              <a:rPr lang="en-US" smtClean="0"/>
+              <a:rPr lang="en-US"/>
               <a:t>Third level</a:t>
             </a:r>
           </a:p>
           <a:p>
             <a:pPr lvl="3"/>
             <a:r>
-              <a:rPr lang="en-US" smtClean="0"/>
+              <a:rPr lang="en-US"/>
               <a:t>Fourth level</a:t>
             </a:r>
           </a:p>
           <a:p>
             <a:pPr lvl="4"/>
             <a:r>
-              <a:rPr lang="en-US" smtClean="0"/>
+              <a:rPr lang="en-US"/>
               <a:t>Fifth level</a:t>
             </a:r>
-            <a:endParaRPr lang="en-US"/>
           </a:p>
         </p:txBody>
       </p:sp>
@@ -521,7 +522,7 @@
           <a:bodyPr/>
           <a:lstStyle/>
           <a:p>
-            <a:endParaRPr lang="en-US" smtClean="0"/>
+            <a:endParaRPr lang="en-US"/>
           </a:p>
         </p:txBody>
       </p:sp>
@@ -545,7 +546,7 @@
             <a:fld id="{2BAF69FA-8F2D-41D5-BC73-0469DBD37D74}" type="slidenum">
               <a:rPr lang="en-US"/>
               <a:pPr/>
-              <a:t>8</a:t>
+              <a:t>10</a:t>
             </a:fld>
             <a:endParaRPr lang="en-US"/>
           </a:p>
@@ -606,10 +607,9 @@
           </a:lstStyle>
           <a:p>
             <a:r>
-              <a:rPr lang="en-US" smtClean="0"/>
+              <a:rPr lang="en-US"/>
               <a:t>Click to edit Master title style</a:t>
             </a:r>
-            <a:endParaRPr lang="en-US"/>
           </a:p>
         </p:txBody>
       </p:sp>
@@ -671,10 +671,9 @@
           </a:lstStyle>
           <a:p>
             <a:r>
-              <a:rPr lang="en-US" smtClean="0"/>
+              <a:rPr lang="en-US"/>
               <a:t>Click to edit Master subtitle style</a:t>
             </a:r>
-            <a:endParaRPr lang="en-US"/>
           </a:p>
         </p:txBody>
       </p:sp>
@@ -789,10 +788,9 @@
           <a:lstStyle/>
           <a:p>
             <a:r>
-              <a:rPr lang="en-US" smtClean="0"/>
+              <a:rPr lang="en-US"/>
               <a:t>Click to edit Master title style</a:t>
             </a:r>
-            <a:endParaRPr lang="en-US"/>
           </a:p>
         </p:txBody>
       </p:sp>
@@ -813,38 +811,37 @@
           <a:p>
             <a:pPr lvl="0"/>
             <a:r>
-              <a:rPr lang="en-US" smtClean="0"/>
+              <a:rPr lang="en-US"/>
               <a:t>Click to edit Master text styles</a:t>
             </a:r>
           </a:p>
           <a:p>
             <a:pPr lvl="1"/>
             <a:r>
-              <a:rPr lang="en-US" smtClean="0"/>
+              <a:rPr lang="en-US"/>
               <a:t>Second level</a:t>
             </a:r>
           </a:p>
           <a:p>
             <a:pPr lvl="2"/>
             <a:r>
-              <a:rPr lang="en-US" smtClean="0"/>
+              <a:rPr lang="en-US"/>
               <a:t>Third level</a:t>
             </a:r>
           </a:p>
           <a:p>
             <a:pPr lvl="3"/>
             <a:r>
-              <a:rPr lang="en-US" smtClean="0"/>
+              <a:rPr lang="en-US"/>
               <a:t>Fourth level</a:t>
             </a:r>
           </a:p>
           <a:p>
             <a:pPr lvl="4"/>
             <a:r>
-              <a:rPr lang="en-US" smtClean="0"/>
+              <a:rPr lang="en-US"/>
               <a:t>Fifth level</a:t>
             </a:r>
-            <a:endParaRPr lang="en-US"/>
           </a:p>
         </p:txBody>
       </p:sp>
@@ -964,10 +961,9 @@
           <a:lstStyle/>
           <a:p>
             <a:r>
-              <a:rPr lang="en-US" smtClean="0"/>
+              <a:rPr lang="en-US"/>
               <a:t>Click to edit Master title style</a:t>
             </a:r>
-            <a:endParaRPr lang="en-US"/>
           </a:p>
         </p:txBody>
       </p:sp>
@@ -993,38 +989,37 @@
           <a:p>
             <a:pPr lvl="0"/>
             <a:r>
-              <a:rPr lang="en-US" smtClean="0"/>
+              <a:rPr lang="en-US"/>
               <a:t>Click to edit Master text styles</a:t>
             </a:r>
           </a:p>
           <a:p>
             <a:pPr lvl="1"/>
             <a:r>
-              <a:rPr lang="en-US" smtClean="0"/>
+              <a:rPr lang="en-US"/>
               <a:t>Second level</a:t>
             </a:r>
           </a:p>
           <a:p>
             <a:pPr lvl="2"/>
             <a:r>
-              <a:rPr lang="en-US" smtClean="0"/>
+              <a:rPr lang="en-US"/>
               <a:t>Third level</a:t>
             </a:r>
           </a:p>
           <a:p>
             <a:pPr lvl="3"/>
             <a:r>
-              <a:rPr lang="en-US" smtClean="0"/>
+              <a:rPr lang="en-US"/>
               <a:t>Fourth level</a:t>
             </a:r>
           </a:p>
           <a:p>
             <a:pPr lvl="4"/>
             <a:r>
-              <a:rPr lang="en-US" smtClean="0"/>
+              <a:rPr lang="en-US"/>
               <a:t>Fifth level</a:t>
             </a:r>
-            <a:endParaRPr lang="en-US"/>
           </a:p>
         </p:txBody>
       </p:sp>
@@ -1139,10 +1134,9 @@
           <a:lstStyle/>
           <a:p>
             <a:r>
-              <a:rPr lang="en-US" smtClean="0"/>
+              <a:rPr lang="en-US"/>
               <a:t>Click to edit Master title style</a:t>
             </a:r>
-            <a:endParaRPr lang="en-US"/>
           </a:p>
         </p:txBody>
       </p:sp>
@@ -1163,38 +1157,37 @@
           <a:p>
             <a:pPr lvl="0"/>
             <a:r>
-              <a:rPr lang="en-US" smtClean="0"/>
+              <a:rPr lang="en-US"/>
               <a:t>Click to edit Master text styles</a:t>
             </a:r>
           </a:p>
           <a:p>
             <a:pPr lvl="1"/>
             <a:r>
-              <a:rPr lang="en-US" smtClean="0"/>
+              <a:rPr lang="en-US"/>
               <a:t>Second level</a:t>
             </a:r>
           </a:p>
           <a:p>
             <a:pPr lvl="2"/>
             <a:r>
-              <a:rPr lang="en-US" smtClean="0"/>
+              <a:rPr lang="en-US"/>
               <a:t>Third level</a:t>
             </a:r>
           </a:p>
           <a:p>
             <a:pPr lvl="3"/>
             <a:r>
-              <a:rPr lang="en-US" smtClean="0"/>
+              <a:rPr lang="en-US"/>
               <a:t>Fourth level</a:t>
             </a:r>
           </a:p>
           <a:p>
             <a:pPr lvl="4"/>
             <a:r>
-              <a:rPr lang="en-US" smtClean="0"/>
+              <a:rPr lang="en-US"/>
               <a:t>Fifth level</a:t>
             </a:r>
-            <a:endParaRPr lang="en-US"/>
           </a:p>
         </p:txBody>
       </p:sp>
@@ -1318,10 +1311,9 @@
           </a:lstStyle>
           <a:p>
             <a:r>
-              <a:rPr lang="en-US" smtClean="0"/>
+              <a:rPr lang="en-US"/>
               <a:t>Click to edit Master title style</a:t>
             </a:r>
-            <a:endParaRPr lang="en-US"/>
           </a:p>
         </p:txBody>
       </p:sp>
@@ -1438,7 +1430,7 @@
           <a:p>
             <a:pPr lvl="0"/>
             <a:r>
-              <a:rPr lang="en-US" smtClean="0"/>
+              <a:rPr lang="en-US"/>
               <a:t>Click to edit Master text styles</a:t>
             </a:r>
           </a:p>
@@ -1555,10 +1547,9 @@
           <a:lstStyle/>
           <a:p>
             <a:r>
-              <a:rPr lang="en-US" smtClean="0"/>
+              <a:rPr lang="en-US"/>
               <a:t>Click to edit Master title style</a:t>
             </a:r>
-            <a:endParaRPr lang="en-US"/>
           </a:p>
         </p:txBody>
       </p:sp>
@@ -1584,38 +1575,37 @@
           <a:p>
             <a:pPr lvl="0"/>
             <a:r>
-              <a:rPr lang="en-US" smtClean="0"/>
+              <a:rPr lang="en-US"/>
               <a:t>Click to edit Master text styles</a:t>
             </a:r>
           </a:p>
           <a:p>
             <a:pPr lvl="1"/>
             <a:r>
-              <a:rPr lang="en-US" smtClean="0"/>
+              <a:rPr lang="en-US"/>
               <a:t>Second level</a:t>
             </a:r>
           </a:p>
           <a:p>
             <a:pPr lvl="2"/>
             <a:r>
-              <a:rPr lang="en-US" smtClean="0"/>
+              <a:rPr lang="en-US"/>
               <a:t>Third level</a:t>
             </a:r>
           </a:p>
           <a:p>
             <a:pPr lvl="3"/>
             <a:r>
-              <a:rPr lang="en-US" smtClean="0"/>
+              <a:rPr lang="en-US"/>
               <a:t>Fourth level</a:t>
             </a:r>
           </a:p>
           <a:p>
             <a:pPr lvl="4"/>
             <a:r>
-              <a:rPr lang="en-US" smtClean="0"/>
+              <a:rPr lang="en-US"/>
               <a:t>Fifth level</a:t>
             </a:r>
-            <a:endParaRPr lang="en-US"/>
           </a:p>
         </p:txBody>
       </p:sp>
@@ -1641,38 +1631,37 @@
           <a:p>
             <a:pPr lvl="0"/>
             <a:r>
-              <a:rPr lang="en-US" smtClean="0"/>
+              <a:rPr lang="en-US"/>
               <a:t>Click to edit Master text styles</a:t>
             </a:r>
           </a:p>
           <a:p>
             <a:pPr lvl="1"/>
             <a:r>
-              <a:rPr lang="en-US" smtClean="0"/>
+              <a:rPr lang="en-US"/>
               <a:t>Second level</a:t>
             </a:r>
           </a:p>
           <a:p>
             <a:pPr lvl="2"/>
             <a:r>
-              <a:rPr lang="en-US" smtClean="0"/>
+              <a:rPr lang="en-US"/>
               <a:t>Third level</a:t>
             </a:r>
           </a:p>
           <a:p>
             <a:pPr lvl="3"/>
             <a:r>
-              <a:rPr lang="en-US" smtClean="0"/>
+              <a:rPr lang="en-US"/>
               <a:t>Fourth level</a:t>
             </a:r>
           </a:p>
           <a:p>
             <a:pPr lvl="4"/>
             <a:r>
-              <a:rPr lang="en-US" smtClean="0"/>
+              <a:rPr lang="en-US"/>
               <a:t>Fifth level</a:t>
             </a:r>
-            <a:endParaRPr lang="en-US"/>
           </a:p>
         </p:txBody>
       </p:sp>
@@ -1792,10 +1781,9 @@
           <a:lstStyle/>
           <a:p>
             <a:r>
-              <a:rPr lang="en-US" smtClean="0"/>
+              <a:rPr lang="en-US"/>
               <a:t>Click to edit Master title style</a:t>
             </a:r>
-            <a:endParaRPr lang="en-US"/>
           </a:p>
         </p:txBody>
       </p:sp>
@@ -1858,7 +1846,7 @@
           <a:p>
             <a:pPr lvl="0"/>
             <a:r>
-              <a:rPr lang="en-US" smtClean="0"/>
+              <a:rPr lang="en-US"/>
               <a:t>Click to edit Master text styles</a:t>
             </a:r>
           </a:p>
@@ -1886,38 +1874,37 @@
           <a:p>
             <a:pPr lvl="0"/>
             <a:r>
-              <a:rPr lang="en-US" smtClean="0"/>
+              <a:rPr lang="en-US"/>
               <a:t>Click to edit Master text styles</a:t>
             </a:r>
           </a:p>
           <a:p>
             <a:pPr lvl="1"/>
             <a:r>
-              <a:rPr lang="en-US" smtClean="0"/>
+              <a:rPr lang="en-US"/>
               <a:t>Second level</a:t>
             </a:r>
           </a:p>
           <a:p>
             <a:pPr lvl="2"/>
             <a:r>
-              <a:rPr lang="en-US" smtClean="0"/>
+              <a:rPr lang="en-US"/>
               <a:t>Third level</a:t>
             </a:r>
           </a:p>
           <a:p>
             <a:pPr lvl="3"/>
             <a:r>
-              <a:rPr lang="en-US" smtClean="0"/>
+              <a:rPr lang="en-US"/>
               <a:t>Fourth level</a:t>
             </a:r>
           </a:p>
           <a:p>
             <a:pPr lvl="4"/>
             <a:r>
-              <a:rPr lang="en-US" smtClean="0"/>
+              <a:rPr lang="en-US"/>
               <a:t>Fifth level</a:t>
             </a:r>
-            <a:endParaRPr lang="en-US"/>
           </a:p>
         </p:txBody>
       </p:sp>
@@ -1980,7 +1967,7 @@
           <a:p>
             <a:pPr lvl="0"/>
             <a:r>
-              <a:rPr lang="en-US" smtClean="0"/>
+              <a:rPr lang="en-US"/>
               <a:t>Click to edit Master text styles</a:t>
             </a:r>
           </a:p>
@@ -2008,38 +1995,37 @@
           <a:p>
             <a:pPr lvl="0"/>
             <a:r>
-              <a:rPr lang="en-US" smtClean="0"/>
+              <a:rPr lang="en-US"/>
               <a:t>Click to edit Master text styles</a:t>
             </a:r>
           </a:p>
           <a:p>
             <a:pPr lvl="1"/>
             <a:r>
-              <a:rPr lang="en-US" smtClean="0"/>
+              <a:rPr lang="en-US"/>
               <a:t>Second level</a:t>
             </a:r>
           </a:p>
           <a:p>
             <a:pPr lvl="2"/>
             <a:r>
-              <a:rPr lang="en-US" smtClean="0"/>
+              <a:rPr lang="en-US"/>
               <a:t>Third level</a:t>
             </a:r>
           </a:p>
           <a:p>
             <a:pPr lvl="3"/>
             <a:r>
-              <a:rPr lang="en-US" smtClean="0"/>
+              <a:rPr lang="en-US"/>
               <a:t>Fourth level</a:t>
             </a:r>
           </a:p>
           <a:p>
             <a:pPr lvl="4"/>
             <a:r>
-              <a:rPr lang="en-US" smtClean="0"/>
+              <a:rPr lang="en-US"/>
               <a:t>Fifth level</a:t>
             </a:r>
-            <a:endParaRPr lang="en-US"/>
           </a:p>
         </p:txBody>
       </p:sp>
@@ -2154,10 +2140,9 @@
           <a:lstStyle/>
           <a:p>
             <a:r>
-              <a:rPr lang="en-US" smtClean="0"/>
+              <a:rPr lang="en-US"/>
               <a:t>Click to edit Master title style</a:t>
             </a:r>
-            <a:endParaRPr lang="en-US"/>
           </a:p>
         </p:txBody>
       </p:sp>
@@ -2376,10 +2361,9 @@
           </a:lstStyle>
           <a:p>
             <a:r>
-              <a:rPr lang="en-US" smtClean="0"/>
+              <a:rPr lang="en-US"/>
               <a:t>Click to edit Master title style</a:t>
             </a:r>
-            <a:endParaRPr lang="en-US"/>
           </a:p>
         </p:txBody>
       </p:sp>
@@ -2433,38 +2417,37 @@
           <a:p>
             <a:pPr lvl="0"/>
             <a:r>
-              <a:rPr lang="en-US" smtClean="0"/>
+              <a:rPr lang="en-US"/>
               <a:t>Click to edit Master text styles</a:t>
             </a:r>
           </a:p>
           <a:p>
             <a:pPr lvl="1"/>
             <a:r>
-              <a:rPr lang="en-US" smtClean="0"/>
+              <a:rPr lang="en-US"/>
               <a:t>Second level</a:t>
             </a:r>
           </a:p>
           <a:p>
             <a:pPr lvl="2"/>
             <a:r>
-              <a:rPr lang="en-US" smtClean="0"/>
+              <a:rPr lang="en-US"/>
               <a:t>Third level</a:t>
             </a:r>
           </a:p>
           <a:p>
             <a:pPr lvl="3"/>
             <a:r>
-              <a:rPr lang="en-US" smtClean="0"/>
+              <a:rPr lang="en-US"/>
               <a:t>Fourth level</a:t>
             </a:r>
           </a:p>
           <a:p>
             <a:pPr lvl="4"/>
             <a:r>
-              <a:rPr lang="en-US" smtClean="0"/>
+              <a:rPr lang="en-US"/>
               <a:t>Fifth level</a:t>
             </a:r>
-            <a:endParaRPr lang="en-US"/>
           </a:p>
         </p:txBody>
       </p:sp>
@@ -2527,7 +2510,7 @@
           <a:p>
             <a:pPr lvl="0"/>
             <a:r>
-              <a:rPr lang="en-US" smtClean="0"/>
+              <a:rPr lang="en-US"/>
               <a:t>Click to edit Master text styles</a:t>
             </a:r>
           </a:p>
@@ -2653,10 +2636,9 @@
           </a:lstStyle>
           <a:p>
             <a:r>
-              <a:rPr lang="en-US" smtClean="0"/>
+              <a:rPr lang="en-US"/>
               <a:t>Click to edit Master title style</a:t>
             </a:r>
-            <a:endParaRPr lang="en-US"/>
           </a:p>
         </p:txBody>
       </p:sp>
@@ -2780,7 +2762,7 @@
           <a:p>
             <a:pPr lvl="0"/>
             <a:r>
-              <a:rPr lang="en-US" smtClean="0"/>
+              <a:rPr lang="en-US"/>
               <a:t>Click to edit Master text styles</a:t>
             </a:r>
           </a:p>
@@ -2912,10 +2894,9 @@
           <a:lstStyle/>
           <a:p>
             <a:r>
-              <a:rPr lang="en-US" smtClean="0"/>
+              <a:rPr lang="en-US"/>
               <a:t>Click to edit Master title style</a:t>
             </a:r>
-            <a:endParaRPr lang="en-US"/>
           </a:p>
         </p:txBody>
       </p:sp>
@@ -2946,38 +2927,37 @@
           <a:p>
             <a:pPr lvl="0"/>
             <a:r>
-              <a:rPr lang="en-US" smtClean="0"/>
+              <a:rPr lang="en-US"/>
               <a:t>Click to edit Master text styles</a:t>
             </a:r>
           </a:p>
           <a:p>
             <a:pPr lvl="1"/>
             <a:r>
-              <a:rPr lang="en-US" smtClean="0"/>
+              <a:rPr lang="en-US"/>
               <a:t>Second level</a:t>
             </a:r>
           </a:p>
           <a:p>
             <a:pPr lvl="2"/>
             <a:r>
-              <a:rPr lang="en-US" smtClean="0"/>
+              <a:rPr lang="en-US"/>
               <a:t>Third level</a:t>
             </a:r>
           </a:p>
           <a:p>
             <a:pPr lvl="3"/>
             <a:r>
-              <a:rPr lang="en-US" smtClean="0"/>
+              <a:rPr lang="en-US"/>
               <a:t>Fourth level</a:t>
             </a:r>
           </a:p>
           <a:p>
             <a:pPr lvl="4"/>
             <a:r>
-              <a:rPr lang="en-US" smtClean="0"/>
+              <a:rPr lang="en-US"/>
               <a:t>Fifth level</a:t>
             </a:r>
-            <a:endParaRPr lang="en-US"/>
           </a:p>
         </p:txBody>
       </p:sp>
@@ -3437,14 +3417,13 @@
           <a:lstStyle/>
           <a:p>
             <a:r>
-              <a:rPr lang="en-US" dirty="0" err="1" smtClean="0"/>
+              <a:rPr lang="en-US" dirty="0" err="1"/>
               <a:t>Cosc</a:t>
             </a:r>
             <a:r>
-              <a:rPr lang="en-US" dirty="0" smtClean="0"/>
+              <a:rPr lang="en-US" dirty="0"/>
               <a:t> 5/4735</a:t>
             </a:r>
-            <a:endParaRPr lang="en-US" dirty="0"/>
           </a:p>
         </p:txBody>
       </p:sp>
@@ -3464,24 +3443,23 @@
           <a:lstStyle/>
           <a:p>
             <a:r>
-              <a:rPr lang="en-US" dirty="0" smtClean="0"/>
+              <a:rPr lang="en-US" dirty="0"/>
               <a:t>Android Wear 2.0</a:t>
             </a:r>
           </a:p>
           <a:p>
             <a:r>
-              <a:rPr lang="en-US" dirty="0" smtClean="0"/>
+              <a:rPr lang="en-US" dirty="0"/>
               <a:t>By: Brant Dolling, Kegan </a:t>
             </a:r>
             <a:r>
-              <a:rPr lang="en-US" dirty="0" err="1" smtClean="0"/>
+              <a:rPr lang="en-US" dirty="0" err="1"/>
               <a:t>McIlwaine</a:t>
             </a:r>
             <a:r>
-              <a:rPr lang="en-US" dirty="0" smtClean="0"/>
+              <a:rPr lang="en-US" dirty="0"/>
               <a:t>, Jay Bishop</a:t>
             </a:r>
-            <a:endParaRPr lang="en-US" dirty="0"/>
           </a:p>
         </p:txBody>
       </p:sp>
@@ -3498,444 +3476,7 @@
 </p:sld>
 </file>
 
-<file path=ppt/slides/slide2.xml><?xml version="1.0" encoding="utf-8"?>
-<p:sld xmlns:a="http://schemas.openxmlformats.org/drawingml/2006/main" xmlns:r="http://schemas.openxmlformats.org/officeDocument/2006/relationships" xmlns:p="http://schemas.openxmlformats.org/presentationml/2006/main">
-  <p:cSld>
-    <p:spTree>
-      <p:nvGrpSpPr>
-        <p:cNvPr id="1" name=""/>
-        <p:cNvGrpSpPr/>
-        <p:nvPr/>
-      </p:nvGrpSpPr>
-      <p:grpSpPr>
-        <a:xfrm>
-          <a:off x="0" y="0"/>
-          <a:ext cx="0" cy="0"/>
-          <a:chOff x="0" y="0"/>
-          <a:chExt cx="0" cy="0"/>
-        </a:xfrm>
-      </p:grpSpPr>
-      <p:sp>
-        <p:nvSpPr>
-          <p:cNvPr id="2" name="Title 1"/>
-          <p:cNvSpPr>
-            <a:spLocks noGrp="1"/>
-          </p:cNvSpPr>
-          <p:nvPr>
-            <p:ph type="title"/>
-          </p:nvPr>
-        </p:nvSpPr>
-        <p:spPr/>
-        <p:txBody>
-          <a:bodyPr/>
-          <a:lstStyle/>
-          <a:p>
-            <a:pPr algn="ctr"/>
-            <a:r>
-              <a:rPr lang="en-US" dirty="0" smtClean="0"/>
-              <a:t>Custom Cards</a:t>
-            </a:r>
-            <a:endParaRPr lang="en-US" dirty="0"/>
-          </a:p>
-        </p:txBody>
-      </p:sp>
-      <p:sp>
-        <p:nvSpPr>
-          <p:cNvPr id="3" name="Content Placeholder 2"/>
-          <p:cNvSpPr>
-            <a:spLocks noGrp="1"/>
-          </p:cNvSpPr>
-          <p:nvPr>
-            <p:ph idx="1"/>
-          </p:nvPr>
-        </p:nvSpPr>
-        <p:spPr/>
-        <p:txBody>
-          <a:bodyPr/>
-          <a:lstStyle/>
-          <a:p>
-            <a:endParaRPr lang="en-US"/>
-          </a:p>
-        </p:txBody>
-      </p:sp>
-    </p:spTree>
-    <p:extLst>
-      <p:ext uri="{BB962C8B-B14F-4D97-AF65-F5344CB8AC3E}">
-        <p14:creationId xmlns:p14="http://schemas.microsoft.com/office/powerpoint/2010/main" val="1838582955"/>
-      </p:ext>
-    </p:extLst>
-  </p:cSld>
-  <p:clrMapOvr>
-    <a:masterClrMapping/>
-  </p:clrMapOvr>
-</p:sld>
-</file>
-
-<file path=ppt/slides/slide3.xml><?xml version="1.0" encoding="utf-8"?>
-<p:sld xmlns:a="http://schemas.openxmlformats.org/drawingml/2006/main" xmlns:r="http://schemas.openxmlformats.org/officeDocument/2006/relationships" xmlns:p="http://schemas.openxmlformats.org/presentationml/2006/main">
-  <p:cSld>
-    <p:spTree>
-      <p:nvGrpSpPr>
-        <p:cNvPr id="1" name=""/>
-        <p:cNvGrpSpPr/>
-        <p:nvPr/>
-      </p:nvGrpSpPr>
-      <p:grpSpPr>
-        <a:xfrm>
-          <a:off x="0" y="0"/>
-          <a:ext cx="0" cy="0"/>
-          <a:chOff x="0" y="0"/>
-          <a:chExt cx="0" cy="0"/>
-        </a:xfrm>
-      </p:grpSpPr>
-      <p:sp>
-        <p:nvSpPr>
-          <p:cNvPr id="2" name="Title 1"/>
-          <p:cNvSpPr>
-            <a:spLocks noGrp="1"/>
-          </p:cNvSpPr>
-          <p:nvPr>
-            <p:ph type="title"/>
-          </p:nvPr>
-        </p:nvSpPr>
-        <p:spPr/>
-        <p:txBody>
-          <a:bodyPr/>
-          <a:lstStyle/>
-          <a:p>
-            <a:pPr algn="ctr"/>
-            <a:r>
-              <a:rPr lang="en-US" dirty="0" smtClean="0"/>
-              <a:t>Lists in Wear</a:t>
-            </a:r>
-            <a:endParaRPr lang="en-US" dirty="0"/>
-          </a:p>
-        </p:txBody>
-      </p:sp>
-      <p:sp>
-        <p:nvSpPr>
-          <p:cNvPr id="3" name="Content Placeholder 2"/>
-          <p:cNvSpPr>
-            <a:spLocks noGrp="1"/>
-          </p:cNvSpPr>
-          <p:nvPr>
-            <p:ph idx="1"/>
-          </p:nvPr>
-        </p:nvSpPr>
-        <p:spPr/>
-        <p:txBody>
-          <a:bodyPr/>
-          <a:lstStyle/>
-          <a:p>
-            <a:endParaRPr lang="en-US"/>
-          </a:p>
-        </p:txBody>
-      </p:sp>
-    </p:spTree>
-    <p:extLst>
-      <p:ext uri="{BB962C8B-B14F-4D97-AF65-F5344CB8AC3E}">
-        <p14:creationId xmlns:p14="http://schemas.microsoft.com/office/powerpoint/2010/main" val="2669957311"/>
-      </p:ext>
-    </p:extLst>
-  </p:cSld>
-  <p:clrMapOvr>
-    <a:masterClrMapping/>
-  </p:clrMapOvr>
-</p:sld>
-</file>
-
-<file path=ppt/slides/slide4.xml><?xml version="1.0" encoding="utf-8"?>
-<p:sld xmlns:a="http://schemas.openxmlformats.org/drawingml/2006/main" xmlns:r="http://schemas.openxmlformats.org/officeDocument/2006/relationships" xmlns:p="http://schemas.openxmlformats.org/presentationml/2006/main">
-  <p:cSld>
-    <p:spTree>
-      <p:nvGrpSpPr>
-        <p:cNvPr id="1" name=""/>
-        <p:cNvGrpSpPr/>
-        <p:nvPr/>
-      </p:nvGrpSpPr>
-      <p:grpSpPr>
-        <a:xfrm>
-          <a:off x="0" y="0"/>
-          <a:ext cx="0" cy="0"/>
-          <a:chOff x="0" y="0"/>
-          <a:chExt cx="0" cy="0"/>
-        </a:xfrm>
-      </p:grpSpPr>
-      <p:sp>
-        <p:nvSpPr>
-          <p:cNvPr id="2" name="Title 1"/>
-          <p:cNvSpPr>
-            <a:spLocks noGrp="1"/>
-          </p:cNvSpPr>
-          <p:nvPr>
-            <p:ph type="title"/>
-          </p:nvPr>
-        </p:nvSpPr>
-        <p:spPr/>
-        <p:txBody>
-          <a:bodyPr/>
-          <a:lstStyle/>
-          <a:p>
-            <a:pPr algn="ctr"/>
-            <a:r>
-              <a:rPr lang="en-US" dirty="0" smtClean="0"/>
-              <a:t>List Adapters</a:t>
-            </a:r>
-            <a:endParaRPr lang="en-US" dirty="0"/>
-          </a:p>
-        </p:txBody>
-      </p:sp>
-      <p:sp>
-        <p:nvSpPr>
-          <p:cNvPr id="3" name="Content Placeholder 2"/>
-          <p:cNvSpPr>
-            <a:spLocks noGrp="1"/>
-          </p:cNvSpPr>
-          <p:nvPr>
-            <p:ph idx="1"/>
-          </p:nvPr>
-        </p:nvSpPr>
-        <p:spPr/>
-        <p:txBody>
-          <a:bodyPr/>
-          <a:lstStyle/>
-          <a:p>
-            <a:endParaRPr lang="en-US"/>
-          </a:p>
-        </p:txBody>
-      </p:sp>
-    </p:spTree>
-    <p:extLst>
-      <p:ext uri="{BB962C8B-B14F-4D97-AF65-F5344CB8AC3E}">
-        <p14:creationId xmlns:p14="http://schemas.microsoft.com/office/powerpoint/2010/main" val="1979634976"/>
-      </p:ext>
-    </p:extLst>
-  </p:cSld>
-  <p:clrMapOvr>
-    <a:masterClrMapping/>
-  </p:clrMapOvr>
-</p:sld>
-</file>
-
-<file path=ppt/slides/slide5.xml><?xml version="1.0" encoding="utf-8"?>
-<p:sld xmlns:a="http://schemas.openxmlformats.org/drawingml/2006/main" xmlns:r="http://schemas.openxmlformats.org/officeDocument/2006/relationships" xmlns:p="http://schemas.openxmlformats.org/presentationml/2006/main">
-  <p:cSld>
-    <p:spTree>
-      <p:nvGrpSpPr>
-        <p:cNvPr id="1" name=""/>
-        <p:cNvGrpSpPr/>
-        <p:nvPr/>
-      </p:nvGrpSpPr>
-      <p:grpSpPr>
-        <a:xfrm>
-          <a:off x="0" y="0"/>
-          <a:ext cx="0" cy="0"/>
-          <a:chOff x="0" y="0"/>
-          <a:chExt cx="0" cy="0"/>
-        </a:xfrm>
-      </p:grpSpPr>
-      <p:sp>
-        <p:nvSpPr>
-          <p:cNvPr id="2" name="Title 1"/>
-          <p:cNvSpPr>
-            <a:spLocks noGrp="1"/>
-          </p:cNvSpPr>
-          <p:nvPr>
-            <p:ph type="title"/>
-          </p:nvPr>
-        </p:nvSpPr>
-        <p:spPr/>
-        <p:txBody>
-          <a:bodyPr/>
-          <a:lstStyle/>
-          <a:p>
-            <a:pPr algn="ctr"/>
-            <a:r>
-              <a:rPr lang="en-US" dirty="0" smtClean="0"/>
-              <a:t>Confirmations</a:t>
-            </a:r>
-            <a:endParaRPr lang="en-US" dirty="0"/>
-          </a:p>
-        </p:txBody>
-      </p:sp>
-      <p:sp>
-        <p:nvSpPr>
-          <p:cNvPr id="3" name="Content Placeholder 2"/>
-          <p:cNvSpPr>
-            <a:spLocks noGrp="1"/>
-          </p:cNvSpPr>
-          <p:nvPr>
-            <p:ph idx="1"/>
-          </p:nvPr>
-        </p:nvSpPr>
-        <p:spPr/>
-        <p:txBody>
-          <a:bodyPr/>
-          <a:lstStyle/>
-          <a:p>
-            <a:endParaRPr lang="en-US"/>
-          </a:p>
-        </p:txBody>
-      </p:sp>
-    </p:spTree>
-    <p:extLst>
-      <p:ext uri="{BB962C8B-B14F-4D97-AF65-F5344CB8AC3E}">
-        <p14:creationId xmlns:p14="http://schemas.microsoft.com/office/powerpoint/2010/main" val="2824081594"/>
-      </p:ext>
-    </p:extLst>
-  </p:cSld>
-  <p:clrMapOvr>
-    <a:masterClrMapping/>
-  </p:clrMapOvr>
-</p:sld>
-</file>
-
-<file path=ppt/slides/slide6.xml><?xml version="1.0" encoding="utf-8"?>
-<p:sld xmlns:a="http://schemas.openxmlformats.org/drawingml/2006/main" xmlns:r="http://schemas.openxmlformats.org/officeDocument/2006/relationships" xmlns:p="http://schemas.openxmlformats.org/presentationml/2006/main">
-  <p:cSld>
-    <p:spTree>
-      <p:nvGrpSpPr>
-        <p:cNvPr id="1" name=""/>
-        <p:cNvGrpSpPr/>
-        <p:nvPr/>
-      </p:nvGrpSpPr>
-      <p:grpSpPr>
-        <a:xfrm>
-          <a:off x="0" y="0"/>
-          <a:ext cx="0" cy="0"/>
-          <a:chOff x="0" y="0"/>
-          <a:chExt cx="0" cy="0"/>
-        </a:xfrm>
-      </p:grpSpPr>
-      <p:sp>
-        <p:nvSpPr>
-          <p:cNvPr id="2" name="Title 1"/>
-          <p:cNvSpPr>
-            <a:spLocks noGrp="1"/>
-          </p:cNvSpPr>
-          <p:nvPr>
-            <p:ph type="title"/>
-          </p:nvPr>
-        </p:nvSpPr>
-        <p:spPr/>
-        <p:txBody>
-          <a:bodyPr/>
-          <a:lstStyle/>
-          <a:p>
-            <a:pPr algn="ctr"/>
-            <a:r>
-              <a:rPr lang="en-US" dirty="0" smtClean="0"/>
-              <a:t>Auto Confirmation Timers</a:t>
-            </a:r>
-            <a:endParaRPr lang="en-US" dirty="0"/>
-          </a:p>
-        </p:txBody>
-      </p:sp>
-      <p:sp>
-        <p:nvSpPr>
-          <p:cNvPr id="3" name="Content Placeholder 2"/>
-          <p:cNvSpPr>
-            <a:spLocks noGrp="1"/>
-          </p:cNvSpPr>
-          <p:nvPr>
-            <p:ph idx="1"/>
-          </p:nvPr>
-        </p:nvSpPr>
-        <p:spPr/>
-        <p:txBody>
-          <a:bodyPr/>
-          <a:lstStyle/>
-          <a:p>
-            <a:endParaRPr lang="en-US"/>
-          </a:p>
-        </p:txBody>
-      </p:sp>
-    </p:spTree>
-    <p:extLst>
-      <p:ext uri="{BB962C8B-B14F-4D97-AF65-F5344CB8AC3E}">
-        <p14:creationId xmlns:p14="http://schemas.microsoft.com/office/powerpoint/2010/main" val="3664338538"/>
-      </p:ext>
-    </p:extLst>
-  </p:cSld>
-  <p:clrMapOvr>
-    <a:masterClrMapping/>
-  </p:clrMapOvr>
-</p:sld>
-</file>
-
-<file path=ppt/slides/slide7.xml><?xml version="1.0" encoding="utf-8"?>
-<p:sld xmlns:a="http://schemas.openxmlformats.org/drawingml/2006/main" xmlns:r="http://schemas.openxmlformats.org/officeDocument/2006/relationships" xmlns:p="http://schemas.openxmlformats.org/presentationml/2006/main">
-  <p:cSld>
-    <p:spTree>
-      <p:nvGrpSpPr>
-        <p:cNvPr id="1" name=""/>
-        <p:cNvGrpSpPr/>
-        <p:nvPr/>
-      </p:nvGrpSpPr>
-      <p:grpSpPr>
-        <a:xfrm>
-          <a:off x="0" y="0"/>
-          <a:ext cx="0" cy="0"/>
-          <a:chOff x="0" y="0"/>
-          <a:chExt cx="0" cy="0"/>
-        </a:xfrm>
-      </p:grpSpPr>
-      <p:sp>
-        <p:nvSpPr>
-          <p:cNvPr id="2" name="Title 1"/>
-          <p:cNvSpPr>
-            <a:spLocks noGrp="1"/>
-          </p:cNvSpPr>
-          <p:nvPr>
-            <p:ph type="title"/>
-          </p:nvPr>
-        </p:nvSpPr>
-        <p:spPr/>
-        <p:txBody>
-          <a:bodyPr/>
-          <a:lstStyle/>
-          <a:p>
-            <a:r>
-              <a:rPr lang="en-US" dirty="0" smtClean="0"/>
-              <a:t>				References</a:t>
-            </a:r>
-            <a:endParaRPr lang="en-US" dirty="0"/>
-          </a:p>
-        </p:txBody>
-      </p:sp>
-      <p:sp>
-        <p:nvSpPr>
-          <p:cNvPr id="3" name="Content Placeholder 2"/>
-          <p:cNvSpPr>
-            <a:spLocks noGrp="1"/>
-          </p:cNvSpPr>
-          <p:nvPr>
-            <p:ph idx="1"/>
-          </p:nvPr>
-        </p:nvSpPr>
-        <p:spPr/>
-        <p:txBody>
-          <a:bodyPr/>
-          <a:lstStyle/>
-          <a:p>
-            <a:endParaRPr lang="en-US" dirty="0"/>
-          </a:p>
-        </p:txBody>
-      </p:sp>
-    </p:spTree>
-    <p:extLst>
-      <p:ext uri="{BB962C8B-B14F-4D97-AF65-F5344CB8AC3E}">
-        <p14:creationId xmlns:p14="http://schemas.microsoft.com/office/powerpoint/2010/main" val="769568546"/>
-      </p:ext>
-    </p:extLst>
-  </p:cSld>
-  <p:clrMapOvr>
-    <a:masterClrMapping/>
-  </p:clrMapOvr>
-</p:sld>
-</file>
-
-<file path=ppt/slides/slide8.xml><?xml version="1.0" encoding="utf-8"?>
+<file path=ppt/slides/slide10.xml><?xml version="1.0" encoding="utf-8"?>
 <p:sld xmlns:a="http://schemas.openxmlformats.org/drawingml/2006/main" xmlns:r="http://schemas.openxmlformats.org/officeDocument/2006/relationships" xmlns:p="http://schemas.openxmlformats.org/presentationml/2006/main">
   <p:cSld>
     <p:spTree>
@@ -4390,6 +3931,1252 @@
       <p:bldP spid="75780" grpId="0" autoUpdateAnimBg="0"/>
     </p:bldLst>
   </p:timing>
+</p:sld>
+</file>
+
+<file path=ppt/slides/slide2.xml><?xml version="1.0" encoding="utf-8"?>
+<p:sld xmlns:a="http://schemas.openxmlformats.org/drawingml/2006/main" xmlns:r="http://schemas.openxmlformats.org/officeDocument/2006/relationships" xmlns:p="http://schemas.openxmlformats.org/presentationml/2006/main">
+  <p:cSld>
+    <p:spTree>
+      <p:nvGrpSpPr>
+        <p:cNvPr id="1" name=""/>
+        <p:cNvGrpSpPr/>
+        <p:nvPr/>
+      </p:nvGrpSpPr>
+      <p:grpSpPr>
+        <a:xfrm>
+          <a:off x="0" y="0"/>
+          <a:ext cx="0" cy="0"/>
+          <a:chOff x="0" y="0"/>
+          <a:chExt cx="0" cy="0"/>
+        </a:xfrm>
+      </p:grpSpPr>
+      <p:sp>
+        <p:nvSpPr>
+          <p:cNvPr id="2" name="Title 1"/>
+          <p:cNvSpPr>
+            <a:spLocks noGrp="1"/>
+          </p:cNvSpPr>
+          <p:nvPr>
+            <p:ph type="title"/>
+          </p:nvPr>
+        </p:nvSpPr>
+        <p:spPr/>
+        <p:txBody>
+          <a:bodyPr/>
+          <a:lstStyle/>
+          <a:p>
+            <a:pPr algn="ctr"/>
+            <a:r>
+              <a:rPr lang="en-US" dirty="0"/>
+              <a:t>What is covered</a:t>
+            </a:r>
+          </a:p>
+        </p:txBody>
+      </p:sp>
+      <p:sp>
+        <p:nvSpPr>
+          <p:cNvPr id="3" name="Content Placeholder 2"/>
+          <p:cNvSpPr>
+            <a:spLocks noGrp="1"/>
+          </p:cNvSpPr>
+          <p:nvPr>
+            <p:ph idx="1"/>
+          </p:nvPr>
+        </p:nvSpPr>
+        <p:spPr/>
+        <p:txBody>
+          <a:bodyPr/>
+          <a:lstStyle/>
+          <a:p>
+            <a:r>
+              <a:rPr lang="en-US" dirty="0"/>
+              <a:t>Custom Cards</a:t>
+            </a:r>
+          </a:p>
+          <a:p>
+            <a:r>
+              <a:rPr lang="en-US" dirty="0"/>
+              <a:t>Action Confirmations</a:t>
+            </a:r>
+          </a:p>
+          <a:p>
+            <a:r>
+              <a:rPr lang="en-US" dirty="0"/>
+              <a:t>Dynamic Watch Faces</a:t>
+            </a:r>
+          </a:p>
+          <a:p>
+            <a:pPr lvl="1"/>
+            <a:r>
+              <a:rPr lang="en-US" dirty="0"/>
+              <a:t>Battery Life</a:t>
+            </a:r>
+          </a:p>
+          <a:p>
+            <a:pPr lvl="1"/>
+            <a:r>
+              <a:rPr lang="en-US" dirty="0"/>
+              <a:t>Color Changing</a:t>
+            </a:r>
+          </a:p>
+          <a:p>
+            <a:pPr lvl="1"/>
+            <a:r>
+              <a:rPr lang="en-US" dirty="0"/>
+              <a:t>Weather</a:t>
+            </a:r>
+          </a:p>
+        </p:txBody>
+      </p:sp>
+    </p:spTree>
+    <p:extLst>
+      <p:ext uri="{BB962C8B-B14F-4D97-AF65-F5344CB8AC3E}">
+        <p14:creationId xmlns:p14="http://schemas.microsoft.com/office/powerpoint/2010/main" val="3476395305"/>
+      </p:ext>
+    </p:extLst>
+  </p:cSld>
+  <p:clrMapOvr>
+    <a:masterClrMapping/>
+  </p:clrMapOvr>
+</p:sld>
+</file>
+
+<file path=ppt/slides/slide3.xml><?xml version="1.0" encoding="utf-8"?>
+<p:sld xmlns:a="http://schemas.openxmlformats.org/drawingml/2006/main" xmlns:r="http://schemas.openxmlformats.org/officeDocument/2006/relationships" xmlns:p="http://schemas.openxmlformats.org/presentationml/2006/main">
+  <p:cSld>
+    <p:spTree>
+      <p:nvGrpSpPr>
+        <p:cNvPr id="1" name=""/>
+        <p:cNvGrpSpPr/>
+        <p:nvPr/>
+      </p:nvGrpSpPr>
+      <p:grpSpPr>
+        <a:xfrm>
+          <a:off x="0" y="0"/>
+          <a:ext cx="0" cy="0"/>
+          <a:chOff x="0" y="0"/>
+          <a:chExt cx="0" cy="0"/>
+        </a:xfrm>
+      </p:grpSpPr>
+      <p:sp>
+        <p:nvSpPr>
+          <p:cNvPr id="2" name="Title 1"/>
+          <p:cNvSpPr>
+            <a:spLocks noGrp="1"/>
+          </p:cNvSpPr>
+          <p:nvPr>
+            <p:ph type="title"/>
+          </p:nvPr>
+        </p:nvSpPr>
+        <p:spPr/>
+        <p:txBody>
+          <a:bodyPr/>
+          <a:lstStyle/>
+          <a:p>
+            <a:pPr algn="ctr"/>
+            <a:r>
+              <a:rPr lang="en-US" dirty="0"/>
+              <a:t>Custom Cards</a:t>
+            </a:r>
+          </a:p>
+        </p:txBody>
+      </p:sp>
+      <p:sp>
+        <p:nvSpPr>
+          <p:cNvPr id="3" name="Content Placeholder 2"/>
+          <p:cNvSpPr>
+            <a:spLocks noGrp="1"/>
+          </p:cNvSpPr>
+          <p:nvPr>
+            <p:ph idx="1"/>
+          </p:nvPr>
+        </p:nvSpPr>
+        <p:spPr>
+          <a:xfrm>
+            <a:off x="278802" y="1690688"/>
+            <a:ext cx="10515600" cy="4351338"/>
+          </a:xfrm>
+        </p:spPr>
+        <p:txBody>
+          <a:bodyPr/>
+          <a:lstStyle/>
+          <a:p>
+            <a:r>
+              <a:rPr lang="en-US" dirty="0"/>
+              <a:t>A way of presenting simple information to a wearable user</a:t>
+            </a:r>
+          </a:p>
+          <a:p>
+            <a:pPr lvl="1">
+              <a:buFont typeface="Wingdings" panose="05000000000000000000" pitchFamily="2" charset="2"/>
+              <a:buChar char="Ø"/>
+            </a:pPr>
+            <a:r>
+              <a:rPr lang="en-US" dirty="0"/>
+              <a:t>Uses a </a:t>
+            </a:r>
+            <a:r>
+              <a:rPr lang="en-US" dirty="0" err="1"/>
+              <a:t>CardFrame</a:t>
+            </a:r>
+            <a:r>
+              <a:rPr lang="en-US" dirty="0"/>
+              <a:t> class to wrap views into card-styled frame</a:t>
+            </a:r>
+          </a:p>
+          <a:p>
+            <a:r>
+              <a:rPr lang="en-US" dirty="0"/>
+              <a:t>Two Ways to make a Custom Card</a:t>
+            </a:r>
+          </a:p>
+          <a:p>
+            <a:pPr marL="914400" lvl="1" indent="-457200">
+              <a:buFont typeface="+mj-lt"/>
+              <a:buAutoNum type="arabicPeriod"/>
+            </a:pPr>
+            <a:r>
+              <a:rPr lang="en-US" dirty="0"/>
+              <a:t>Extending the </a:t>
+            </a:r>
+            <a:r>
+              <a:rPr lang="en-US" dirty="0" err="1"/>
+              <a:t>CardFragment</a:t>
+            </a:r>
+            <a:r>
+              <a:rPr lang="en-US" dirty="0"/>
+              <a:t> class</a:t>
+            </a:r>
+          </a:p>
+          <a:p>
+            <a:pPr marL="914400" lvl="1" indent="-457200">
+              <a:buFont typeface="+mj-lt"/>
+              <a:buAutoNum type="arabicPeriod"/>
+            </a:pPr>
+            <a:r>
+              <a:rPr lang="en-US" dirty="0"/>
+              <a:t>Adding a card directly to a layout</a:t>
+            </a:r>
+          </a:p>
+          <a:p>
+            <a:pPr lvl="1">
+              <a:buFont typeface="Wingdings" panose="05000000000000000000" pitchFamily="2" charset="2"/>
+              <a:buChar char="Ø"/>
+            </a:pPr>
+            <a:endParaRPr lang="en-US" dirty="0"/>
+          </a:p>
+        </p:txBody>
+      </p:sp>
+      <p:pic>
+        <p:nvPicPr>
+          <p:cNvPr id="2050" name="Picture 2" descr="http://www.jebiga.com/wp-content/uploads/2014/03/ANDROID_WEAR_GOOGLE_003.jpg"/>
+          <p:cNvPicPr>
+            <a:picLocks noChangeAspect="1" noChangeArrowheads="1"/>
+          </p:cNvPicPr>
+          <p:nvPr/>
+        </p:nvPicPr>
+        <p:blipFill>
+          <a:blip r:embed="rId2">
+            <a:extLst>
+              <a:ext uri="{28A0092B-C50C-407E-A947-70E740481C1C}">
+                <a14:useLocalDpi xmlns:a14="http://schemas.microsoft.com/office/drawing/2010/main" val="0"/>
+              </a:ext>
+            </a:extLst>
+          </a:blip>
+          <a:srcRect/>
+          <a:stretch>
+            <a:fillRect/>
+          </a:stretch>
+        </p:blipFill>
+        <p:spPr bwMode="auto">
+          <a:xfrm>
+            <a:off x="5841403" y="2716305"/>
+            <a:ext cx="6350598" cy="4141695"/>
+          </a:xfrm>
+          <a:prstGeom prst="rect">
+            <a:avLst/>
+          </a:prstGeom>
+          <a:noFill/>
+          <a:extLst>
+            <a:ext uri="{909E8E84-426E-40DD-AFC4-6F175D3DCCD1}">
+              <a14:hiddenFill xmlns:a14="http://schemas.microsoft.com/office/drawing/2010/main">
+                <a:solidFill>
+                  <a:srgbClr val="FFFFFF"/>
+                </a:solidFill>
+              </a14:hiddenFill>
+            </a:ext>
+          </a:extLst>
+        </p:spPr>
+      </p:pic>
+    </p:spTree>
+    <p:extLst>
+      <p:ext uri="{BB962C8B-B14F-4D97-AF65-F5344CB8AC3E}">
+        <p14:creationId xmlns:p14="http://schemas.microsoft.com/office/powerpoint/2010/main" val="1838582955"/>
+      </p:ext>
+    </p:extLst>
+  </p:cSld>
+  <p:clrMapOvr>
+    <a:masterClrMapping/>
+  </p:clrMapOvr>
+</p:sld>
+</file>
+
+<file path=ppt/slides/slide4.xml><?xml version="1.0" encoding="utf-8"?>
+<p:sld xmlns:a="http://schemas.openxmlformats.org/drawingml/2006/main" xmlns:r="http://schemas.openxmlformats.org/officeDocument/2006/relationships" xmlns:p="http://schemas.openxmlformats.org/presentationml/2006/main">
+  <p:cSld>
+    <p:spTree>
+      <p:nvGrpSpPr>
+        <p:cNvPr id="1" name=""/>
+        <p:cNvGrpSpPr/>
+        <p:nvPr/>
+      </p:nvGrpSpPr>
+      <p:grpSpPr>
+        <a:xfrm>
+          <a:off x="0" y="0"/>
+          <a:ext cx="0" cy="0"/>
+          <a:chOff x="0" y="0"/>
+          <a:chExt cx="0" cy="0"/>
+        </a:xfrm>
+      </p:grpSpPr>
+      <p:sp>
+        <p:nvSpPr>
+          <p:cNvPr id="2" name="Title 1"/>
+          <p:cNvSpPr>
+            <a:spLocks noGrp="1"/>
+          </p:cNvSpPr>
+          <p:nvPr>
+            <p:ph type="title"/>
+          </p:nvPr>
+        </p:nvSpPr>
+        <p:spPr/>
+        <p:txBody>
+          <a:bodyPr/>
+          <a:lstStyle/>
+          <a:p>
+            <a:pPr algn="ctr"/>
+            <a:r>
+              <a:rPr lang="en-US" dirty="0"/>
+              <a:t>Card Fragment</a:t>
+            </a:r>
+          </a:p>
+        </p:txBody>
+      </p:sp>
+      <p:sp>
+        <p:nvSpPr>
+          <p:cNvPr id="3" name="Content Placeholder 2"/>
+          <p:cNvSpPr>
+            <a:spLocks noGrp="1"/>
+          </p:cNvSpPr>
+          <p:nvPr>
+            <p:ph idx="1"/>
+          </p:nvPr>
+        </p:nvSpPr>
+        <p:spPr/>
+        <p:txBody>
+          <a:bodyPr/>
+          <a:lstStyle/>
+          <a:p>
+            <a:r>
+              <a:rPr lang="en-US" dirty="0"/>
+              <a:t>The Card Fragment class provides a default card layout that includes a title, description, and an icon</a:t>
+            </a:r>
+          </a:p>
+          <a:p>
+            <a:r>
+              <a:rPr lang="en-US" dirty="0"/>
+              <a:t>A Card Fragment is created as follows</a:t>
+            </a:r>
+          </a:p>
+          <a:p>
+            <a:pPr lvl="1">
+              <a:buFont typeface="Wingdings" panose="05000000000000000000" pitchFamily="2" charset="2"/>
+              <a:buChar char="Ø"/>
+            </a:pPr>
+            <a:r>
+              <a:rPr lang="en-US" dirty="0" err="1"/>
+              <a:t>CardFragment</a:t>
+            </a:r>
+            <a:r>
+              <a:rPr lang="en-US" dirty="0"/>
+              <a:t> name = </a:t>
+            </a:r>
+            <a:r>
+              <a:rPr lang="en-US" dirty="0" err="1"/>
+              <a:t>CardFragment.create</a:t>
+            </a:r>
+            <a:r>
+              <a:rPr lang="en-US" dirty="0"/>
+              <a:t>(</a:t>
+            </a:r>
+          </a:p>
+          <a:p>
+            <a:pPr marL="457200" lvl="1" indent="0">
+              <a:buNone/>
+            </a:pPr>
+            <a:r>
+              <a:rPr lang="en-US" dirty="0"/>
+              <a:t>	String title, String description, Icon icon);</a:t>
+            </a:r>
+          </a:p>
+          <a:p>
+            <a:r>
+              <a:rPr lang="en-US" dirty="0"/>
+              <a:t>You may then add this </a:t>
+            </a:r>
+            <a:r>
+              <a:rPr lang="en-US" dirty="0" err="1"/>
+              <a:t>CardFragment</a:t>
+            </a:r>
+            <a:r>
+              <a:rPr lang="en-US" dirty="0"/>
+              <a:t> to a</a:t>
+            </a:r>
+          </a:p>
+          <a:p>
+            <a:pPr marL="0" indent="0">
+              <a:buNone/>
+            </a:pPr>
+            <a:r>
+              <a:rPr lang="en-US" dirty="0"/>
+              <a:t>	</a:t>
+            </a:r>
+            <a:r>
+              <a:rPr lang="en-US" dirty="0" err="1"/>
+              <a:t>fragmentTransaction</a:t>
+            </a:r>
+            <a:r>
+              <a:rPr lang="en-US" dirty="0"/>
+              <a:t> and display it</a:t>
+            </a:r>
+          </a:p>
+          <a:p>
+            <a:pPr marL="457200" lvl="1" indent="0">
+              <a:buNone/>
+            </a:pPr>
+            <a:endParaRPr lang="en-US" dirty="0"/>
+          </a:p>
+          <a:p>
+            <a:pPr marL="457200" lvl="1" indent="0">
+              <a:buNone/>
+            </a:pPr>
+            <a:endParaRPr lang="en-US" dirty="0"/>
+          </a:p>
+        </p:txBody>
+      </p:sp>
+      <p:pic>
+        <p:nvPicPr>
+          <p:cNvPr id="4" name="Picture 3"/>
+          <p:cNvPicPr>
+            <a:picLocks noChangeAspect="1"/>
+          </p:cNvPicPr>
+          <p:nvPr/>
+        </p:nvPicPr>
+        <p:blipFill>
+          <a:blip r:embed="rId2">
+            <a:extLst>
+              <a:ext uri="{28A0092B-C50C-407E-A947-70E740481C1C}">
+                <a14:useLocalDpi xmlns:a14="http://schemas.microsoft.com/office/drawing/2010/main" val="0"/>
+              </a:ext>
+            </a:extLst>
+          </a:blip>
+          <a:stretch>
+            <a:fillRect/>
+          </a:stretch>
+        </p:blipFill>
+        <p:spPr>
+          <a:xfrm>
+            <a:off x="8834413" y="3467075"/>
+            <a:ext cx="3357587" cy="3390925"/>
+          </a:xfrm>
+          <a:prstGeom prst="rect">
+            <a:avLst/>
+          </a:prstGeom>
+        </p:spPr>
+      </p:pic>
+    </p:spTree>
+    <p:extLst>
+      <p:ext uri="{BB962C8B-B14F-4D97-AF65-F5344CB8AC3E}">
+        <p14:creationId xmlns:p14="http://schemas.microsoft.com/office/powerpoint/2010/main" val="2669957311"/>
+      </p:ext>
+    </p:extLst>
+  </p:cSld>
+  <p:clrMapOvr>
+    <a:masterClrMapping/>
+  </p:clrMapOvr>
+</p:sld>
+</file>
+
+<file path=ppt/slides/slide5.xml><?xml version="1.0" encoding="utf-8"?>
+<p:sld xmlns:a="http://schemas.openxmlformats.org/drawingml/2006/main" xmlns:r="http://schemas.openxmlformats.org/officeDocument/2006/relationships" xmlns:p="http://schemas.openxmlformats.org/presentationml/2006/main">
+  <p:cSld>
+    <p:spTree>
+      <p:nvGrpSpPr>
+        <p:cNvPr id="1" name=""/>
+        <p:cNvGrpSpPr/>
+        <p:nvPr/>
+      </p:nvGrpSpPr>
+      <p:grpSpPr>
+        <a:xfrm>
+          <a:off x="0" y="0"/>
+          <a:ext cx="0" cy="0"/>
+          <a:chOff x="0" y="0"/>
+          <a:chExt cx="0" cy="0"/>
+        </a:xfrm>
+      </p:grpSpPr>
+      <p:sp>
+        <p:nvSpPr>
+          <p:cNvPr id="2" name="Title 1"/>
+          <p:cNvSpPr>
+            <a:spLocks noGrp="1"/>
+          </p:cNvSpPr>
+          <p:nvPr>
+            <p:ph type="title"/>
+          </p:nvPr>
+        </p:nvSpPr>
+        <p:spPr/>
+        <p:txBody>
+          <a:bodyPr/>
+          <a:lstStyle/>
+          <a:p>
+            <a:pPr algn="ctr"/>
+            <a:r>
+              <a:rPr lang="en-US" dirty="0"/>
+              <a:t>Adding Cards to a Layout</a:t>
+            </a:r>
+          </a:p>
+        </p:txBody>
+      </p:sp>
+      <p:pic>
+        <p:nvPicPr>
+          <p:cNvPr id="6" name="Content Placeholder 5"/>
+          <p:cNvPicPr>
+            <a:picLocks noGrp="1" noChangeAspect="1"/>
+          </p:cNvPicPr>
+          <p:nvPr>
+            <p:ph idx="1"/>
+          </p:nvPr>
+        </p:nvPicPr>
+        <p:blipFill>
+          <a:blip r:embed="rId2">
+            <a:extLst>
+              <a:ext uri="{28A0092B-C50C-407E-A947-70E740481C1C}">
+                <a14:useLocalDpi xmlns:a14="http://schemas.microsoft.com/office/drawing/2010/main" val="0"/>
+              </a:ext>
+            </a:extLst>
+          </a:blip>
+          <a:stretch>
+            <a:fillRect/>
+          </a:stretch>
+        </p:blipFill>
+        <p:spPr>
+          <a:xfrm>
+            <a:off x="8967764" y="3284442"/>
+            <a:ext cx="3224236" cy="3633814"/>
+          </a:xfrm>
+        </p:spPr>
+      </p:pic>
+      <p:sp>
+        <p:nvSpPr>
+          <p:cNvPr id="8" name="TextBox 7"/>
+          <p:cNvSpPr txBox="1"/>
+          <p:nvPr/>
+        </p:nvSpPr>
+        <p:spPr>
+          <a:xfrm>
+            <a:off x="688489" y="1930998"/>
+            <a:ext cx="7702476" cy="2677656"/>
+          </a:xfrm>
+          <a:prstGeom prst="rect">
+            <a:avLst/>
+          </a:prstGeom>
+          <a:noFill/>
+        </p:spPr>
+        <p:txBody>
+          <a:bodyPr wrap="square" rtlCol="0">
+            <a:spAutoFit/>
+          </a:bodyPr>
+          <a:lstStyle/>
+          <a:p>
+            <a:pPr marL="285750" indent="-285750">
+              <a:buFont typeface="Arial" panose="020B0604020202020204" pitchFamily="34" charset="0"/>
+              <a:buChar char="•"/>
+            </a:pPr>
+            <a:r>
+              <a:rPr lang="en-US" sz="2400" dirty="0"/>
+              <a:t>Cards may also be added to an xml layout</a:t>
+            </a:r>
+          </a:p>
+          <a:p>
+            <a:pPr marL="800100" lvl="1" indent="-342900">
+              <a:buFont typeface="Wingdings" panose="05000000000000000000" pitchFamily="2" charset="2"/>
+              <a:buChar char="Ø"/>
+            </a:pPr>
+            <a:r>
+              <a:rPr lang="en-US" sz="2400" dirty="0"/>
+              <a:t>Done by creating a </a:t>
+            </a:r>
+            <a:r>
+              <a:rPr lang="en-US" sz="2400" dirty="0" err="1"/>
+              <a:t>CardFrame</a:t>
+            </a:r>
+            <a:r>
+              <a:rPr lang="en-US" sz="2400" dirty="0"/>
+              <a:t> and then adding subsequent elements to that frame, such as a </a:t>
+            </a:r>
+            <a:r>
+              <a:rPr lang="en-US" sz="2400" dirty="0" err="1"/>
+              <a:t>textView</a:t>
+            </a:r>
+            <a:r>
+              <a:rPr lang="en-US" sz="2400" dirty="0"/>
+              <a:t> for a title</a:t>
+            </a:r>
+          </a:p>
+          <a:p>
+            <a:pPr marL="800100" lvl="1" indent="-342900">
+              <a:buFont typeface="Wingdings" panose="05000000000000000000" pitchFamily="2" charset="2"/>
+              <a:buChar char="Ø"/>
+            </a:pPr>
+            <a:r>
+              <a:rPr lang="en-US" sz="2400" dirty="0"/>
+              <a:t>Can also use a </a:t>
+            </a:r>
+            <a:r>
+              <a:rPr lang="en-US" sz="2400" dirty="0" err="1"/>
+              <a:t>CardScrollView</a:t>
+            </a:r>
+            <a:r>
+              <a:rPr lang="en-US" sz="2400" dirty="0"/>
+              <a:t> to detect which type of watch face is being used and display the frame appropriately</a:t>
+            </a:r>
+          </a:p>
+        </p:txBody>
+      </p:sp>
+      <p:pic>
+        <p:nvPicPr>
+          <p:cNvPr id="12" name="Picture 11"/>
+          <p:cNvPicPr>
+            <a:picLocks noChangeAspect="1"/>
+          </p:cNvPicPr>
+          <p:nvPr/>
+        </p:nvPicPr>
+        <p:blipFill>
+          <a:blip r:embed="rId3">
+            <a:extLst>
+              <a:ext uri="{28A0092B-C50C-407E-A947-70E740481C1C}">
+                <a14:useLocalDpi xmlns:a14="http://schemas.microsoft.com/office/drawing/2010/main" val="0"/>
+              </a:ext>
+            </a:extLst>
+          </a:blip>
+          <a:stretch>
+            <a:fillRect/>
+          </a:stretch>
+        </p:blipFill>
+        <p:spPr>
+          <a:xfrm>
+            <a:off x="4084787" y="4448287"/>
+            <a:ext cx="4373367" cy="2157178"/>
+          </a:xfrm>
+          <a:prstGeom prst="rect">
+            <a:avLst/>
+          </a:prstGeom>
+        </p:spPr>
+      </p:pic>
+    </p:spTree>
+    <p:extLst>
+      <p:ext uri="{BB962C8B-B14F-4D97-AF65-F5344CB8AC3E}">
+        <p14:creationId xmlns:p14="http://schemas.microsoft.com/office/powerpoint/2010/main" val="1979634976"/>
+      </p:ext>
+    </p:extLst>
+  </p:cSld>
+  <p:clrMapOvr>
+    <a:masterClrMapping/>
+  </p:clrMapOvr>
+</p:sld>
+</file>
+
+<file path=ppt/slides/slide6.xml><?xml version="1.0" encoding="utf-8"?>
+<p:sld xmlns:a="http://schemas.openxmlformats.org/drawingml/2006/main" xmlns:r="http://schemas.openxmlformats.org/officeDocument/2006/relationships" xmlns:p="http://schemas.openxmlformats.org/presentationml/2006/main">
+  <p:cSld>
+    <p:spTree>
+      <p:nvGrpSpPr>
+        <p:cNvPr id="1" name=""/>
+        <p:cNvGrpSpPr/>
+        <p:nvPr/>
+      </p:nvGrpSpPr>
+      <p:grpSpPr>
+        <a:xfrm>
+          <a:off x="0" y="0"/>
+          <a:ext cx="0" cy="0"/>
+          <a:chOff x="0" y="0"/>
+          <a:chExt cx="0" cy="0"/>
+        </a:xfrm>
+      </p:grpSpPr>
+      <p:sp>
+        <p:nvSpPr>
+          <p:cNvPr id="2" name="Title 1"/>
+          <p:cNvSpPr>
+            <a:spLocks noGrp="1"/>
+          </p:cNvSpPr>
+          <p:nvPr>
+            <p:ph type="title"/>
+          </p:nvPr>
+        </p:nvSpPr>
+        <p:spPr/>
+        <p:txBody>
+          <a:bodyPr/>
+          <a:lstStyle/>
+          <a:p>
+            <a:pPr algn="ctr"/>
+            <a:r>
+              <a:rPr lang="en-US" dirty="0"/>
+              <a:t>Action Buttons and Confirmations</a:t>
+            </a:r>
+          </a:p>
+        </p:txBody>
+      </p:sp>
+      <p:sp>
+        <p:nvSpPr>
+          <p:cNvPr id="3" name="Content Placeholder 2"/>
+          <p:cNvSpPr>
+            <a:spLocks noGrp="1"/>
+          </p:cNvSpPr>
+          <p:nvPr>
+            <p:ph idx="1"/>
+          </p:nvPr>
+        </p:nvSpPr>
+        <p:spPr/>
+        <p:txBody>
+          <a:bodyPr/>
+          <a:lstStyle/>
+          <a:p>
+            <a:r>
+              <a:rPr lang="en-US" dirty="0"/>
+              <a:t>Action Buttons are when a user is prompted to take action on a notification: Causes a specific action to be executed</a:t>
+            </a:r>
+          </a:p>
+          <a:p>
+            <a:pPr lvl="1">
+              <a:buFont typeface="Wingdings" panose="05000000000000000000" pitchFamily="2" charset="2"/>
+              <a:buChar char="Ø"/>
+            </a:pPr>
+            <a:r>
+              <a:rPr lang="en-US" dirty="0"/>
+              <a:t>See original Android Wear lecture for more information</a:t>
+            </a:r>
+          </a:p>
+          <a:p>
+            <a:endParaRPr lang="en-US" dirty="0"/>
+          </a:p>
+          <a:p>
+            <a:endParaRPr lang="en-US" dirty="0"/>
+          </a:p>
+          <a:p>
+            <a:r>
+              <a:rPr lang="en-US" dirty="0"/>
+              <a:t>Action confirmations allow the user to act upon an action that is about to be executed by an Action button.</a:t>
+            </a:r>
+          </a:p>
+          <a:p>
+            <a:pPr lvl="1">
+              <a:buFont typeface="Wingdings" panose="05000000000000000000" pitchFamily="2" charset="2"/>
+              <a:buChar char="Ø"/>
+            </a:pPr>
+            <a:r>
+              <a:rPr lang="en-US" dirty="0"/>
+              <a:t>The picture on the right shows off a confirmation that</a:t>
+            </a:r>
+          </a:p>
+          <a:p>
+            <a:pPr marL="457200" lvl="1" indent="0">
+              <a:buNone/>
+            </a:pPr>
+            <a:r>
+              <a:rPr lang="en-US" dirty="0"/>
+              <a:t>	allows the user to cancel the action before it begins</a:t>
+            </a:r>
+          </a:p>
+        </p:txBody>
+      </p:sp>
+      <p:pic>
+        <p:nvPicPr>
+          <p:cNvPr id="4" name="Picture 3"/>
+          <p:cNvPicPr>
+            <a:picLocks noChangeAspect="1"/>
+          </p:cNvPicPr>
+          <p:nvPr/>
+        </p:nvPicPr>
+        <p:blipFill>
+          <a:blip r:embed="rId2">
+            <a:extLst>
+              <a:ext uri="{28A0092B-C50C-407E-A947-70E740481C1C}">
+                <a14:useLocalDpi xmlns:a14="http://schemas.microsoft.com/office/drawing/2010/main" val="0"/>
+              </a:ext>
+            </a:extLst>
+          </a:blip>
+          <a:stretch>
+            <a:fillRect/>
+          </a:stretch>
+        </p:blipFill>
+        <p:spPr>
+          <a:xfrm>
+            <a:off x="8847638" y="2398212"/>
+            <a:ext cx="1390660" cy="1395423"/>
+          </a:xfrm>
+          <a:prstGeom prst="rect">
+            <a:avLst/>
+          </a:prstGeom>
+        </p:spPr>
+      </p:pic>
+      <p:pic>
+        <p:nvPicPr>
+          <p:cNvPr id="5" name="Picture 4"/>
+          <p:cNvPicPr>
+            <a:picLocks noChangeAspect="1"/>
+          </p:cNvPicPr>
+          <p:nvPr/>
+        </p:nvPicPr>
+        <p:blipFill>
+          <a:blip r:embed="rId3">
+            <a:extLst>
+              <a:ext uri="{28A0092B-C50C-407E-A947-70E740481C1C}">
+                <a14:useLocalDpi xmlns:a14="http://schemas.microsoft.com/office/drawing/2010/main" val="0"/>
+              </a:ext>
+            </a:extLst>
+          </a:blip>
+          <a:stretch>
+            <a:fillRect/>
+          </a:stretch>
+        </p:blipFill>
+        <p:spPr>
+          <a:xfrm>
+            <a:off x="8564267" y="4796911"/>
+            <a:ext cx="1957402" cy="1952639"/>
+          </a:xfrm>
+          <a:prstGeom prst="rect">
+            <a:avLst/>
+          </a:prstGeom>
+        </p:spPr>
+      </p:pic>
+    </p:spTree>
+    <p:extLst>
+      <p:ext uri="{BB962C8B-B14F-4D97-AF65-F5344CB8AC3E}">
+        <p14:creationId xmlns:p14="http://schemas.microsoft.com/office/powerpoint/2010/main" val="2824081594"/>
+      </p:ext>
+    </p:extLst>
+  </p:cSld>
+  <p:clrMapOvr>
+    <a:masterClrMapping/>
+  </p:clrMapOvr>
+</p:sld>
+</file>
+
+<file path=ppt/slides/slide7.xml><?xml version="1.0" encoding="utf-8"?>
+<p:sld xmlns:a="http://schemas.openxmlformats.org/drawingml/2006/main" xmlns:r="http://schemas.openxmlformats.org/officeDocument/2006/relationships" xmlns:p="http://schemas.openxmlformats.org/presentationml/2006/main">
+  <p:cSld>
+    <p:spTree>
+      <p:nvGrpSpPr>
+        <p:cNvPr id="1" name=""/>
+        <p:cNvGrpSpPr/>
+        <p:nvPr/>
+      </p:nvGrpSpPr>
+      <p:grpSpPr>
+        <a:xfrm>
+          <a:off x="0" y="0"/>
+          <a:ext cx="0" cy="0"/>
+          <a:chOff x="0" y="0"/>
+          <a:chExt cx="0" cy="0"/>
+        </a:xfrm>
+      </p:grpSpPr>
+      <p:sp>
+        <p:nvSpPr>
+          <p:cNvPr id="2" name="Title 1"/>
+          <p:cNvSpPr>
+            <a:spLocks noGrp="1"/>
+          </p:cNvSpPr>
+          <p:nvPr>
+            <p:ph type="title"/>
+          </p:nvPr>
+        </p:nvSpPr>
+        <p:spPr/>
+        <p:txBody>
+          <a:bodyPr/>
+          <a:lstStyle/>
+          <a:p>
+            <a:pPr algn="ctr"/>
+            <a:r>
+              <a:rPr lang="en-US" dirty="0"/>
+              <a:t>Auto Confirmation Timers</a:t>
+            </a:r>
+          </a:p>
+        </p:txBody>
+      </p:sp>
+      <p:sp>
+        <p:nvSpPr>
+          <p:cNvPr id="3" name="Content Placeholder 2"/>
+          <p:cNvSpPr>
+            <a:spLocks noGrp="1"/>
+          </p:cNvSpPr>
+          <p:nvPr>
+            <p:ph idx="1"/>
+          </p:nvPr>
+        </p:nvSpPr>
+        <p:spPr/>
+        <p:txBody>
+          <a:bodyPr/>
+          <a:lstStyle/>
+          <a:p>
+            <a:r>
+              <a:rPr lang="en-US" dirty="0"/>
+              <a:t>Lets users cancel an action that they just performed</a:t>
+            </a:r>
+          </a:p>
+          <a:p>
+            <a:r>
+              <a:rPr lang="en-US" dirty="0"/>
+              <a:t>When an action is performed, an app shows a button to cancel the action with a timer animation, and begins the timer</a:t>
+            </a:r>
+          </a:p>
+          <a:p>
+            <a:pPr lvl="1">
+              <a:buFont typeface="Wingdings" panose="05000000000000000000" pitchFamily="2" charset="2"/>
+              <a:buChar char="Ø"/>
+            </a:pPr>
+            <a:r>
+              <a:rPr lang="en-US" dirty="0"/>
+              <a:t>App is notified if thee action is cancelled and when the timer expires</a:t>
+            </a:r>
+          </a:p>
+          <a:p>
+            <a:r>
+              <a:rPr lang="en-US" dirty="0"/>
+              <a:t>Done by adding a &lt;</a:t>
+            </a:r>
+            <a:r>
+              <a:rPr lang="en-US" dirty="0" err="1"/>
+              <a:t>DelayedConfirmationView</a:t>
+            </a:r>
+            <a:r>
+              <a:rPr lang="en-US" dirty="0"/>
+              <a:t>&gt; to a layout and implementing the </a:t>
+            </a:r>
+            <a:r>
+              <a:rPr lang="en-US" dirty="0" err="1"/>
+              <a:t>DelayedConfirmationListener</a:t>
+            </a:r>
+            <a:r>
+              <a:rPr lang="en-US" dirty="0"/>
+              <a:t> interface in your activity</a:t>
+            </a:r>
+          </a:p>
+          <a:p>
+            <a:pPr lvl="1">
+              <a:buFont typeface="Wingdings" panose="05000000000000000000" pitchFamily="2" charset="2"/>
+              <a:buChar char="Ø"/>
+            </a:pPr>
+            <a:r>
+              <a:rPr lang="en-US" dirty="0"/>
+              <a:t>Contains methods </a:t>
+            </a:r>
+            <a:r>
+              <a:rPr lang="en-US" dirty="0" err="1"/>
+              <a:t>onTimerSelected</a:t>
+            </a:r>
+            <a:r>
+              <a:rPr lang="en-US" dirty="0"/>
+              <a:t> for when the user cancels the action, and </a:t>
+            </a:r>
+            <a:r>
+              <a:rPr lang="en-US" dirty="0" err="1"/>
+              <a:t>onTimerFinished</a:t>
+            </a:r>
+            <a:r>
+              <a:rPr lang="en-US" dirty="0"/>
+              <a:t> for when the timer runs out</a:t>
+            </a:r>
+          </a:p>
+        </p:txBody>
+      </p:sp>
+    </p:spTree>
+    <p:extLst>
+      <p:ext uri="{BB962C8B-B14F-4D97-AF65-F5344CB8AC3E}">
+        <p14:creationId xmlns:p14="http://schemas.microsoft.com/office/powerpoint/2010/main" val="3664338538"/>
+      </p:ext>
+    </p:extLst>
+  </p:cSld>
+  <p:clrMapOvr>
+    <a:masterClrMapping/>
+  </p:clrMapOvr>
+</p:sld>
+</file>
+
+<file path=ppt/slides/slide8.xml><?xml version="1.0" encoding="utf-8"?>
+<p:sld xmlns:a="http://schemas.openxmlformats.org/drawingml/2006/main" xmlns:r="http://schemas.openxmlformats.org/officeDocument/2006/relationships" xmlns:p="http://schemas.openxmlformats.org/presentationml/2006/main">
+  <p:cSld>
+    <p:spTree>
+      <p:nvGrpSpPr>
+        <p:cNvPr id="1" name=""/>
+        <p:cNvGrpSpPr/>
+        <p:nvPr/>
+      </p:nvGrpSpPr>
+      <p:grpSpPr>
+        <a:xfrm>
+          <a:off x="0" y="0"/>
+          <a:ext cx="0" cy="0"/>
+          <a:chOff x="0" y="0"/>
+          <a:chExt cx="0" cy="0"/>
+        </a:xfrm>
+      </p:grpSpPr>
+      <p:sp>
+        <p:nvSpPr>
+          <p:cNvPr id="2" name="Title 1"/>
+          <p:cNvSpPr>
+            <a:spLocks noGrp="1"/>
+          </p:cNvSpPr>
+          <p:nvPr>
+            <p:ph type="title"/>
+          </p:nvPr>
+        </p:nvSpPr>
+        <p:spPr/>
+        <p:txBody>
+          <a:bodyPr/>
+          <a:lstStyle/>
+          <a:p>
+            <a:pPr algn="ctr"/>
+            <a:r>
+              <a:rPr lang="en-US" dirty="0"/>
+              <a:t>Confirmation Animations</a:t>
+            </a:r>
+          </a:p>
+        </p:txBody>
+      </p:sp>
+      <p:sp>
+        <p:nvSpPr>
+          <p:cNvPr id="3" name="Content Placeholder 2"/>
+          <p:cNvSpPr>
+            <a:spLocks noGrp="1"/>
+          </p:cNvSpPr>
+          <p:nvPr>
+            <p:ph idx="1"/>
+          </p:nvPr>
+        </p:nvSpPr>
+        <p:spPr/>
+        <p:txBody>
+          <a:bodyPr/>
+          <a:lstStyle/>
+          <a:p>
+            <a:r>
+              <a:rPr lang="en-US" dirty="0"/>
+              <a:t>An animation that shows once a user completes an action in your application</a:t>
+            </a:r>
+          </a:p>
+          <a:p>
+            <a:r>
+              <a:rPr lang="en-US" dirty="0"/>
+              <a:t>Done by creating an intent in your activity that starts </a:t>
+            </a:r>
+            <a:r>
+              <a:rPr lang="en-US" dirty="0" err="1"/>
+              <a:t>ConfirmationActivity</a:t>
+            </a:r>
+            <a:endParaRPr lang="en-US" dirty="0"/>
+          </a:p>
+          <a:p>
+            <a:pPr lvl="1">
+              <a:buFont typeface="Wingdings" panose="05000000000000000000" pitchFamily="2" charset="2"/>
+              <a:buChar char="Ø"/>
+            </a:pPr>
+            <a:r>
+              <a:rPr lang="en-US" dirty="0"/>
+              <a:t>You may also add an intent extra, EXTRA_ANIMATION_TYPE to have the animation be a specific one, such as a SUCCESS_ANIMATION etc.</a:t>
+            </a:r>
+          </a:p>
+        </p:txBody>
+      </p:sp>
+      <p:pic>
+        <p:nvPicPr>
+          <p:cNvPr id="4" name="Picture 3"/>
+          <p:cNvPicPr>
+            <a:picLocks noChangeAspect="1"/>
+          </p:cNvPicPr>
+          <p:nvPr/>
+        </p:nvPicPr>
+        <p:blipFill>
+          <a:blip r:embed="rId2">
+            <a:extLst>
+              <a:ext uri="{28A0092B-C50C-407E-A947-70E740481C1C}">
+                <a14:useLocalDpi xmlns:a14="http://schemas.microsoft.com/office/drawing/2010/main" val="0"/>
+              </a:ext>
+            </a:extLst>
+          </a:blip>
+          <a:stretch>
+            <a:fillRect/>
+          </a:stretch>
+        </p:blipFill>
+        <p:spPr>
+          <a:xfrm>
+            <a:off x="9991627" y="4615978"/>
+            <a:ext cx="2200373" cy="2257608"/>
+          </a:xfrm>
+          <a:prstGeom prst="rect">
+            <a:avLst/>
+          </a:prstGeom>
+        </p:spPr>
+      </p:pic>
+      <p:pic>
+        <p:nvPicPr>
+          <p:cNvPr id="5" name="Picture 4"/>
+          <p:cNvPicPr>
+            <a:picLocks noChangeAspect="1"/>
+          </p:cNvPicPr>
+          <p:nvPr/>
+        </p:nvPicPr>
+        <p:blipFill>
+          <a:blip r:embed="rId3">
+            <a:extLst>
+              <a:ext uri="{28A0092B-C50C-407E-A947-70E740481C1C}">
+                <a14:useLocalDpi xmlns:a14="http://schemas.microsoft.com/office/drawing/2010/main" val="0"/>
+              </a:ext>
+            </a:extLst>
+          </a:blip>
+          <a:stretch>
+            <a:fillRect/>
+          </a:stretch>
+        </p:blipFill>
+        <p:spPr>
+          <a:xfrm>
+            <a:off x="1506070" y="4615978"/>
+            <a:ext cx="7508838" cy="1839861"/>
+          </a:xfrm>
+          <a:prstGeom prst="rect">
+            <a:avLst/>
+          </a:prstGeom>
+        </p:spPr>
+      </p:pic>
+    </p:spTree>
+    <p:extLst>
+      <p:ext uri="{BB962C8B-B14F-4D97-AF65-F5344CB8AC3E}">
+        <p14:creationId xmlns:p14="http://schemas.microsoft.com/office/powerpoint/2010/main" val="1988954442"/>
+      </p:ext>
+    </p:extLst>
+  </p:cSld>
+  <p:clrMapOvr>
+    <a:masterClrMapping/>
+  </p:clrMapOvr>
+</p:sld>
+</file>
+
+<file path=ppt/slides/slide9.xml><?xml version="1.0" encoding="utf-8"?>
+<p:sld xmlns:a="http://schemas.openxmlformats.org/drawingml/2006/main" xmlns:r="http://schemas.openxmlformats.org/officeDocument/2006/relationships" xmlns:p="http://schemas.openxmlformats.org/presentationml/2006/main">
+  <p:cSld>
+    <p:spTree>
+      <p:nvGrpSpPr>
+        <p:cNvPr id="1" name=""/>
+        <p:cNvGrpSpPr/>
+        <p:nvPr/>
+      </p:nvGrpSpPr>
+      <p:grpSpPr>
+        <a:xfrm>
+          <a:off x="0" y="0"/>
+          <a:ext cx="0" cy="0"/>
+          <a:chOff x="0" y="0"/>
+          <a:chExt cx="0" cy="0"/>
+        </a:xfrm>
+      </p:grpSpPr>
+      <p:sp>
+        <p:nvSpPr>
+          <p:cNvPr id="2" name="Title 1"/>
+          <p:cNvSpPr>
+            <a:spLocks noGrp="1"/>
+          </p:cNvSpPr>
+          <p:nvPr>
+            <p:ph type="title"/>
+          </p:nvPr>
+        </p:nvSpPr>
+        <p:spPr/>
+        <p:txBody>
+          <a:bodyPr/>
+          <a:lstStyle/>
+          <a:p>
+            <a:r>
+              <a:rPr lang="en-US" dirty="0"/>
+              <a:t>				References</a:t>
+            </a:r>
+          </a:p>
+        </p:txBody>
+      </p:sp>
+      <p:sp>
+        <p:nvSpPr>
+          <p:cNvPr id="3" name="Content Placeholder 2"/>
+          <p:cNvSpPr>
+            <a:spLocks noGrp="1"/>
+          </p:cNvSpPr>
+          <p:nvPr>
+            <p:ph idx="1"/>
+          </p:nvPr>
+        </p:nvSpPr>
+        <p:spPr/>
+        <p:txBody>
+          <a:bodyPr/>
+          <a:lstStyle/>
+          <a:p>
+            <a:r>
+              <a:rPr lang="en-US" dirty="0"/>
+              <a:t>Android’s training site</a:t>
+            </a:r>
+          </a:p>
+          <a:p>
+            <a:pPr marL="457200" lvl="1" indent="0">
+              <a:buNone/>
+            </a:pPr>
+            <a:r>
+              <a:rPr lang="en-US" dirty="0">
+                <a:hlinkClick r:id="rId2"/>
+              </a:rPr>
+              <a:t>http://developer.android.com/training/building-wearables.html</a:t>
+            </a:r>
+            <a:endParaRPr lang="en-US" dirty="0"/>
+          </a:p>
+          <a:p>
+            <a:pPr marL="457200" lvl="1" indent="0">
+              <a:buNone/>
+            </a:pPr>
+            <a:r>
+              <a:rPr lang="en-US" dirty="0">
+                <a:hlinkClick r:id="rId3"/>
+              </a:rPr>
+              <a:t>http://developer.android.com/training/wearables/ui/confirm.html</a:t>
+            </a:r>
+            <a:endParaRPr lang="en-US" dirty="0"/>
+          </a:p>
+          <a:p>
+            <a:pPr marL="457200" lvl="1" indent="0">
+              <a:buNone/>
+            </a:pPr>
+            <a:r>
+              <a:rPr lang="en-US" dirty="0">
+                <a:hlinkClick r:id="rId4"/>
+              </a:rPr>
+              <a:t>http://developer.android.com/training/wearables/ui/cards.html</a:t>
+            </a:r>
+            <a:r>
+              <a:rPr lang="en-US" dirty="0"/>
+              <a:t>   </a:t>
+            </a:r>
+          </a:p>
+        </p:txBody>
+      </p:sp>
+    </p:spTree>
+    <p:extLst>
+      <p:ext uri="{BB962C8B-B14F-4D97-AF65-F5344CB8AC3E}">
+        <p14:creationId xmlns:p14="http://schemas.microsoft.com/office/powerpoint/2010/main" val="769568546"/>
+      </p:ext>
+    </p:extLst>
+  </p:cSld>
+  <p:clrMapOvr>
+    <a:masterClrMapping/>
+  </p:clrMapOvr>
 </p:sld>
 </file>
 

</xml_diff>

<commit_message>
I put Kegan's links in the Power Point
</commit_message>
<xml_diff>
--- a/Presentation.pptx
+++ b/Presentation.pptx
@@ -3473,6 +3473,13 @@
   <p:clrMapOvr>
     <a:masterClrMapping/>
   </p:clrMapOvr>
+  <p:timing>
+    <p:tnLst>
+      <p:par>
+        <p:cTn id="1" dur="indefinite" restart="never" nodeType="tmRoot"/>
+      </p:par>
+    </p:tnLst>
+  </p:timing>
 </p:sld>
 </file>
 
@@ -4039,6 +4046,13 @@
   <p:clrMapOvr>
     <a:masterClrMapping/>
   </p:clrMapOvr>
+  <p:timing>
+    <p:tnLst>
+      <p:par>
+        <p:cTn id="1" dur="indefinite" restart="never" nodeType="tmRoot"/>
+      </p:par>
+    </p:tnLst>
+  </p:timing>
 </p:sld>
 </file>
 
@@ -4219,6 +4233,13 @@
   <p:clrMapOvr>
     <a:masterClrMapping/>
   </p:clrMapOvr>
+  <p:timing>
+    <p:tnLst>
+      <p:par>
+        <p:cTn id="1" dur="indefinite" restart="never" nodeType="tmRoot"/>
+      </p:par>
+    </p:tnLst>
+  </p:timing>
 </p:sld>
 </file>
 
@@ -4404,6 +4425,13 @@
   <p:clrMapOvr>
     <a:masterClrMapping/>
   </p:clrMapOvr>
+  <p:timing>
+    <p:tnLst>
+      <p:par>
+        <p:cTn id="1" dur="indefinite" restart="never" nodeType="tmRoot"/>
+      </p:par>
+    </p:tnLst>
+  </p:timing>
 </p:sld>
 </file>
 
@@ -4593,6 +4621,13 @@
   <p:clrMapOvr>
     <a:masterClrMapping/>
   </p:clrMapOvr>
+  <p:timing>
+    <p:tnLst>
+      <p:par>
+        <p:cTn id="1" dur="indefinite" restart="never" nodeType="tmRoot"/>
+      </p:par>
+    </p:tnLst>
+  </p:timing>
 </p:sld>
 </file>
 
@@ -4769,6 +4804,13 @@
   <p:clrMapOvr>
     <a:masterClrMapping/>
   </p:clrMapOvr>
+  <p:timing>
+    <p:tnLst>
+      <p:par>
+        <p:cTn id="1" dur="indefinite" restart="never" nodeType="tmRoot"/>
+      </p:par>
+    </p:tnLst>
+  </p:timing>
 </p:sld>
 </file>
 
@@ -4908,6 +4950,13 @@
   <p:clrMapOvr>
     <a:masterClrMapping/>
   </p:clrMapOvr>
+  <p:timing>
+    <p:tnLst>
+      <p:par>
+        <p:cTn id="1" dur="indefinite" restart="never" nodeType="tmRoot"/>
+      </p:par>
+    </p:tnLst>
+  </p:timing>
 </p:sld>
 </file>
 
@@ -5064,6 +5113,13 @@
   <p:clrMapOvr>
     <a:masterClrMapping/>
   </p:clrMapOvr>
+  <p:timing>
+    <p:tnLst>
+      <p:par>
+        <p:cTn id="1" dur="indefinite" restart="never" nodeType="tmRoot"/>
+      </p:par>
+    </p:tnLst>
+  </p:timing>
 </p:sld>
 </file>
 
@@ -5158,12 +5214,156 @@
               <a:rPr lang="en-US" dirty="0">
                 <a:hlinkClick r:id="rId4"/>
               </a:rPr>
-              <a:t>http://developer.android.com/training/wearables/ui/cards.html</a:t>
-            </a:r>
-            <a:r>
-              <a:rPr lang="en-US" dirty="0"/>
+              <a:t>http://</a:t>
+            </a:r>
+            <a:r>
+              <a:rPr lang="en-US" dirty="0" smtClean="0">
+                <a:hlinkClick r:id="rId4"/>
+              </a:rPr>
+              <a:t>developer.android.com/training/wearables/ui/cards.html</a:t>
+            </a:r>
+            <a:endParaRPr lang="en-US" dirty="0" smtClean="0"/>
+          </a:p>
+          <a:p>
+            <a:pPr marL="457200" lvl="1" indent="0">
+              <a:buNone/>
+            </a:pPr>
+            <a:r>
+              <a:rPr lang="en-US" dirty="0">
+                <a:hlinkClick r:id="rId5"/>
+              </a:rPr>
+              <a:t>http://</a:t>
+            </a:r>
+            <a:r>
+              <a:rPr lang="en-US" dirty="0" smtClean="0">
+                <a:hlinkClick r:id="rId5"/>
+              </a:rPr>
+              <a:t>developer.android.com/training/wearables/watch-faces/configuration.html#Listener</a:t>
+            </a:r>
+            <a:r>
+              <a:rPr lang="en-US" dirty="0" smtClean="0"/>
+              <a:t> </a:t>
+            </a:r>
+            <a:r>
+              <a:rPr lang="en-US" dirty="0"/>
+              <a:t/>
+            </a:r>
+            <a:br>
+              <a:rPr lang="en-US" dirty="0"/>
+            </a:br>
+            <a:r>
+              <a:rPr lang="en-US" dirty="0">
+                <a:hlinkClick r:id="rId6"/>
+              </a:rPr>
+              <a:t>http://</a:t>
+            </a:r>
+            <a:r>
+              <a:rPr lang="en-US" dirty="0" smtClean="0">
+                <a:hlinkClick r:id="rId6"/>
+              </a:rPr>
+              <a:t>developer.android.com/training/wearables/apps/always-on.html</a:t>
+            </a:r>
+            <a:r>
+              <a:rPr lang="en-US" dirty="0" smtClean="0"/>
+              <a:t> </a:t>
+            </a:r>
+            <a:r>
+              <a:rPr lang="en-US" dirty="0"/>
+              <a:t/>
+            </a:r>
+            <a:br>
+              <a:rPr lang="en-US" dirty="0"/>
+            </a:br>
+            <a:r>
+              <a:rPr lang="en-US" dirty="0">
+                <a:hlinkClick r:id="rId7"/>
+              </a:rPr>
+              <a:t>http://</a:t>
+            </a:r>
+            <a:r>
+              <a:rPr lang="en-US" dirty="0" smtClean="0">
+                <a:hlinkClick r:id="rId7"/>
+              </a:rPr>
+              <a:t>developer.android.com/samples/WatchFace/index.html</a:t>
+            </a:r>
+            <a:r>
+              <a:rPr lang="en-US" dirty="0" smtClean="0"/>
+              <a:t> </a:t>
+            </a:r>
+            <a:r>
+              <a:rPr lang="en-US" dirty="0"/>
+              <a:t/>
+            </a:r>
+            <a:br>
+              <a:rPr lang="en-US" dirty="0"/>
+            </a:br>
+            <a:r>
+              <a:rPr lang="en-US" dirty="0">
+                <a:hlinkClick r:id="rId8"/>
+              </a:rPr>
+              <a:t>http://</a:t>
+            </a:r>
+            <a:r>
+              <a:rPr lang="en-US" dirty="0" smtClean="0">
+                <a:hlinkClick r:id="rId8"/>
+              </a:rPr>
+              <a:t>developer.android.com/training/wearables/data-layer/events.html</a:t>
+            </a:r>
+            <a:r>
+              <a:rPr lang="en-US" dirty="0" smtClean="0"/>
+              <a:t> </a:t>
+            </a:r>
+            <a:r>
+              <a:rPr lang="en-US" dirty="0"/>
+              <a:t/>
+            </a:r>
+            <a:br>
+              <a:rPr lang="en-US" dirty="0"/>
+            </a:br>
+            <a:r>
+              <a:rPr lang="en-US" dirty="0">
+                <a:hlinkClick r:id="rId9"/>
+              </a:rPr>
+              <a:t>http://</a:t>
+            </a:r>
+            <a:r>
+              <a:rPr lang="en-US" dirty="0" smtClean="0">
+                <a:hlinkClick r:id="rId9"/>
+              </a:rPr>
+              <a:t>stackoverflow.com/questions/27538742/adding-a-simple-toggle-configuration-for-watch-face-android-wear</a:t>
+            </a:r>
+            <a:r>
+              <a:rPr lang="en-US" dirty="0" smtClean="0"/>
+              <a:t> </a:t>
+            </a:r>
+            <a:r>
+              <a:rPr lang="en-US" dirty="0"/>
+              <a:t/>
+            </a:r>
+            <a:br>
+              <a:rPr lang="en-US" dirty="0"/>
+            </a:br>
+            <a:r>
+              <a:rPr lang="en-US" dirty="0">
+                <a:hlinkClick r:id="rId10"/>
+              </a:rPr>
+              <a:t>http://</a:t>
+            </a:r>
+            <a:r>
+              <a:rPr lang="en-US" dirty="0" smtClean="0">
+                <a:hlinkClick r:id="rId10"/>
+              </a:rPr>
+              <a:t>developer.android.com/training/wearables/data-layer/data-items.html</a:t>
+            </a:r>
+            <a:r>
+              <a:rPr lang="en-US" dirty="0" smtClean="0"/>
+              <a:t> </a:t>
+            </a:r>
+            <a:r>
+              <a:rPr lang="en-US" dirty="0" smtClean="0"/>
               <a:t>   </a:t>
             </a:r>
+            <a:endParaRPr lang="en-US" dirty="0"/>
           </a:p>
         </p:txBody>
       </p:sp>
@@ -5177,6 +5377,13 @@
   <p:clrMapOvr>
     <a:masterClrMapping/>
   </p:clrMapOvr>
+  <p:timing>
+    <p:tnLst>
+      <p:par>
+        <p:cTn id="1" dur="indefinite" restart="never" nodeType="tmRoot"/>
+      </p:par>
+    </p:tnLst>
+  </p:timing>
 </p:sld>
 </file>
 

</xml_diff>